<commit_message>
Changed model to match california
</commit_message>
<xml_diff>
--- a/project/Graph.pptx
+++ b/project/Graph.pptx
@@ -7,6 +7,7 @@
   <p:sldIdLst>
     <p:sldId id="256" r:id="rId2"/>
     <p:sldId id="257" r:id="rId3"/>
+    <p:sldId id="258" r:id="rId4"/>
   </p:sldIdLst>
   <p:sldSz cx="12192000" cy="6858000"/>
   <p:notesSz cx="6858000" cy="9144000"/>
@@ -260,7 +261,7 @@
           <a:p>
             <a:fld id="{6CAB02B1-9762-4C93-A786-2E40134C7DDD}" type="datetimeFigureOut">
               <a:rPr lang="en-US" smtClean="0"/>
-              <a:t>4/16/2022</a:t>
+              <a:t>4/17/2022</a:t>
             </a:fld>
             <a:endParaRPr lang="en-US"/>
           </a:p>
@@ -458,7 +459,7 @@
           <a:p>
             <a:fld id="{6CAB02B1-9762-4C93-A786-2E40134C7DDD}" type="datetimeFigureOut">
               <a:rPr lang="en-US" smtClean="0"/>
-              <a:t>4/16/2022</a:t>
+              <a:t>4/17/2022</a:t>
             </a:fld>
             <a:endParaRPr lang="en-US"/>
           </a:p>
@@ -666,7 +667,7 @@
           <a:p>
             <a:fld id="{6CAB02B1-9762-4C93-A786-2E40134C7DDD}" type="datetimeFigureOut">
               <a:rPr lang="en-US" smtClean="0"/>
-              <a:t>4/16/2022</a:t>
+              <a:t>4/17/2022</a:t>
             </a:fld>
             <a:endParaRPr lang="en-US"/>
           </a:p>
@@ -864,7 +865,7 @@
           <a:p>
             <a:fld id="{6CAB02B1-9762-4C93-A786-2E40134C7DDD}" type="datetimeFigureOut">
               <a:rPr lang="en-US" smtClean="0"/>
-              <a:t>4/16/2022</a:t>
+              <a:t>4/17/2022</a:t>
             </a:fld>
             <a:endParaRPr lang="en-US"/>
           </a:p>
@@ -1139,7 +1140,7 @@
           <a:p>
             <a:fld id="{6CAB02B1-9762-4C93-A786-2E40134C7DDD}" type="datetimeFigureOut">
               <a:rPr lang="en-US" smtClean="0"/>
-              <a:t>4/16/2022</a:t>
+              <a:t>4/17/2022</a:t>
             </a:fld>
             <a:endParaRPr lang="en-US"/>
           </a:p>
@@ -1404,7 +1405,7 @@
           <a:p>
             <a:fld id="{6CAB02B1-9762-4C93-A786-2E40134C7DDD}" type="datetimeFigureOut">
               <a:rPr lang="en-US" smtClean="0"/>
-              <a:t>4/16/2022</a:t>
+              <a:t>4/17/2022</a:t>
             </a:fld>
             <a:endParaRPr lang="en-US"/>
           </a:p>
@@ -1816,7 +1817,7 @@
           <a:p>
             <a:fld id="{6CAB02B1-9762-4C93-A786-2E40134C7DDD}" type="datetimeFigureOut">
               <a:rPr lang="en-US" smtClean="0"/>
-              <a:t>4/16/2022</a:t>
+              <a:t>4/17/2022</a:t>
             </a:fld>
             <a:endParaRPr lang="en-US"/>
           </a:p>
@@ -1957,7 +1958,7 @@
           <a:p>
             <a:fld id="{6CAB02B1-9762-4C93-A786-2E40134C7DDD}" type="datetimeFigureOut">
               <a:rPr lang="en-US" smtClean="0"/>
-              <a:t>4/16/2022</a:t>
+              <a:t>4/17/2022</a:t>
             </a:fld>
             <a:endParaRPr lang="en-US"/>
           </a:p>
@@ -2070,7 +2071,7 @@
           <a:p>
             <a:fld id="{6CAB02B1-9762-4C93-A786-2E40134C7DDD}" type="datetimeFigureOut">
               <a:rPr lang="en-US" smtClean="0"/>
-              <a:t>4/16/2022</a:t>
+              <a:t>4/17/2022</a:t>
             </a:fld>
             <a:endParaRPr lang="en-US"/>
           </a:p>
@@ -2381,7 +2382,7 @@
           <a:p>
             <a:fld id="{6CAB02B1-9762-4C93-A786-2E40134C7DDD}" type="datetimeFigureOut">
               <a:rPr lang="en-US" smtClean="0"/>
-              <a:t>4/16/2022</a:t>
+              <a:t>4/17/2022</a:t>
             </a:fld>
             <a:endParaRPr lang="en-US"/>
           </a:p>
@@ -2669,7 +2670,7 @@
           <a:p>
             <a:fld id="{6CAB02B1-9762-4C93-A786-2E40134C7DDD}" type="datetimeFigureOut">
               <a:rPr lang="en-US" smtClean="0"/>
-              <a:t>4/16/2022</a:t>
+              <a:t>4/17/2022</a:t>
             </a:fld>
             <a:endParaRPr lang="en-US"/>
           </a:p>
@@ -2910,7 +2911,7 @@
           <a:p>
             <a:fld id="{6CAB02B1-9762-4C93-A786-2E40134C7DDD}" type="datetimeFigureOut">
               <a:rPr lang="en-US" smtClean="0"/>
-              <a:t>4/16/2022</a:t>
+              <a:t>4/17/2022</a:t>
             </a:fld>
             <a:endParaRPr lang="en-US"/>
           </a:p>
@@ -3343,8 +3344,8 @@
         </p:nvCxnSpPr>
         <p:spPr>
           <a:xfrm flipH="1">
-            <a:off x="4748169" y="1023457"/>
-            <a:ext cx="402671" cy="0"/>
+            <a:off x="4832059" y="419450"/>
+            <a:ext cx="1057013" cy="0"/>
           </a:xfrm>
           <a:prstGeom prst="line">
             <a:avLst/>
@@ -3381,8 +3382,8 @@
         </p:nvCxnSpPr>
         <p:spPr>
           <a:xfrm flipH="1">
-            <a:off x="4748169" y="1434517"/>
-            <a:ext cx="402671" cy="0"/>
+            <a:off x="4832059" y="830510"/>
+            <a:ext cx="1057013" cy="0"/>
           </a:xfrm>
           <a:prstGeom prst="line">
             <a:avLst/>
@@ -3419,7 +3420,7 @@
         </p:nvCxnSpPr>
         <p:spPr>
           <a:xfrm flipV="1">
-            <a:off x="4748169" y="1023457"/>
+            <a:off x="4832059" y="419450"/>
             <a:ext cx="0" cy="411060"/>
           </a:xfrm>
           <a:prstGeom prst="line">
@@ -3434,6 +3435,83 @@
             <a:schemeClr val="dk1"/>
           </a:fillRef>
           <a:effectRef idx="1">
+            <a:schemeClr val="dk1"/>
+          </a:effectRef>
+          <a:fontRef idx="minor">
+            <a:schemeClr val="tx1"/>
+          </a:fontRef>
+        </p:style>
+      </p:cxnSp>
+      <p:sp>
+        <p:nvSpPr>
+          <p:cNvPr id="23" name="TextBox 22">
+            <a:extLst>
+              <a:ext uri="{FF2B5EF4-FFF2-40B4-BE49-F238E27FC236}">
+                <a16:creationId xmlns:a16="http://schemas.microsoft.com/office/drawing/2014/main" id="{7A14A1A2-4351-4068-914B-DD57A96B5DAB}"/>
+              </a:ext>
+            </a:extLst>
+          </p:cNvPr>
+          <p:cNvSpPr txBox="1"/>
+          <p:nvPr/>
+        </p:nvSpPr>
+        <p:spPr>
+          <a:xfrm>
+            <a:off x="4832059" y="432140"/>
+            <a:ext cx="1031131" cy="369332"/>
+          </a:xfrm>
+          <a:prstGeom prst="rect">
+            <a:avLst/>
+          </a:prstGeom>
+          <a:noFill/>
+        </p:spPr>
+        <p:txBody>
+          <a:bodyPr wrap="square" rtlCol="0">
+            <a:spAutoFit/>
+          </a:bodyPr>
+          <a:lstStyle/>
+          <a:p>
+            <a:pPr algn="ctr"/>
+            <a:r>
+              <a:rPr lang="en-US" dirty="0"/>
+              <a:t>Check In</a:t>
+            </a:r>
+          </a:p>
+        </p:txBody>
+      </p:sp>
+      <p:cxnSp>
+        <p:nvCxnSpPr>
+          <p:cNvPr id="31" name="Straight Arrow Connector 30">
+            <a:extLst>
+              <a:ext uri="{FF2B5EF4-FFF2-40B4-BE49-F238E27FC236}">
+                <a16:creationId xmlns:a16="http://schemas.microsoft.com/office/drawing/2014/main" id="{E3E425DE-7C37-4329-9ABD-043254DBFB8D}"/>
+              </a:ext>
+            </a:extLst>
+          </p:cNvPr>
+          <p:cNvCxnSpPr>
+            <a:cxnSpLocks/>
+          </p:cNvCxnSpPr>
+          <p:nvPr/>
+        </p:nvCxnSpPr>
+        <p:spPr>
+          <a:xfrm flipV="1">
+            <a:off x="3636630" y="627171"/>
+            <a:ext cx="1111538" cy="74972"/>
+          </a:xfrm>
+          <a:prstGeom prst="straightConnector1">
+            <a:avLst/>
+          </a:prstGeom>
+          <a:ln>
+            <a:tailEnd type="triangle"/>
+          </a:ln>
+        </p:spPr>
+        <p:style>
+          <a:lnRef idx="1">
+            <a:schemeClr val="dk1"/>
+          </a:lnRef>
+          <a:fillRef idx="0">
+            <a:schemeClr val="dk1"/>
+          </a:fillRef>
+          <a:effectRef idx="0">
             <a:schemeClr val="dk1"/>
           </a:effectRef>
           <a:fontRef idx="minor">
@@ -3443,10 +3521,10 @@
       </p:cxnSp>
       <p:cxnSp>
         <p:nvCxnSpPr>
-          <p:cNvPr id="16" name="Straight Connector 15">
-            <a:extLst>
-              <a:ext uri="{FF2B5EF4-FFF2-40B4-BE49-F238E27FC236}">
-                <a16:creationId xmlns:a16="http://schemas.microsoft.com/office/drawing/2014/main" id="{2F331A6D-32DC-4AD9-BB54-7D0CF53DDBA0}"/>
+          <p:cNvPr id="33" name="Straight Arrow Connector 32">
+            <a:extLst>
+              <a:ext uri="{FF2B5EF4-FFF2-40B4-BE49-F238E27FC236}">
+                <a16:creationId xmlns:a16="http://schemas.microsoft.com/office/drawing/2014/main" id="{3A7630DF-5972-4D11-B683-5E856BA96DF2}"/>
               </a:ext>
             </a:extLst>
           </p:cNvPr>
@@ -3456,22 +3534,25 @@
           <p:nvPr/>
         </p:nvCxnSpPr>
         <p:spPr>
-          <a:xfrm flipH="1">
-            <a:off x="4748168" y="1703129"/>
-            <a:ext cx="402671" cy="0"/>
-          </a:xfrm>
-          <a:prstGeom prst="line">
+          <a:xfrm>
+            <a:off x="6145639" y="664657"/>
+            <a:ext cx="398860" cy="2884797"/>
+          </a:xfrm>
+          <a:prstGeom prst="straightConnector1">
             <a:avLst/>
           </a:prstGeom>
+          <a:ln>
+            <a:tailEnd type="triangle"/>
+          </a:ln>
         </p:spPr>
         <p:style>
-          <a:lnRef idx="2">
+          <a:lnRef idx="1">
             <a:schemeClr val="dk1"/>
           </a:lnRef>
           <a:fillRef idx="0">
             <a:schemeClr val="dk1"/>
           </a:fillRef>
-          <a:effectRef idx="1">
+          <a:effectRef idx="0">
             <a:schemeClr val="dk1"/>
           </a:effectRef>
           <a:fontRef idx="minor">
@@ -3479,204 +3560,14 @@
           </a:fontRef>
         </p:style>
       </p:cxnSp>
-      <p:cxnSp>
-        <p:nvCxnSpPr>
-          <p:cNvPr id="17" name="Straight Connector 16">
-            <a:extLst>
-              <a:ext uri="{FF2B5EF4-FFF2-40B4-BE49-F238E27FC236}">
-                <a16:creationId xmlns:a16="http://schemas.microsoft.com/office/drawing/2014/main" id="{AA0CCA69-9CB7-4BC7-BB80-A2472F0BA851}"/>
-              </a:ext>
-            </a:extLst>
-          </p:cNvPr>
-          <p:cNvCxnSpPr>
-            <a:cxnSpLocks/>
-          </p:cNvCxnSpPr>
-          <p:nvPr/>
-        </p:nvCxnSpPr>
-        <p:spPr>
-          <a:xfrm flipH="1">
-            <a:off x="4748168" y="2114189"/>
-            <a:ext cx="402671" cy="0"/>
-          </a:xfrm>
-          <a:prstGeom prst="line">
-            <a:avLst/>
-          </a:prstGeom>
-        </p:spPr>
-        <p:style>
-          <a:lnRef idx="2">
-            <a:schemeClr val="dk1"/>
-          </a:lnRef>
-          <a:fillRef idx="0">
-            <a:schemeClr val="dk1"/>
-          </a:fillRef>
-          <a:effectRef idx="1">
-            <a:schemeClr val="dk1"/>
-          </a:effectRef>
-          <a:fontRef idx="minor">
-            <a:schemeClr val="tx1"/>
-          </a:fontRef>
-        </p:style>
-      </p:cxnSp>
-      <p:cxnSp>
-        <p:nvCxnSpPr>
-          <p:cNvPr id="18" name="Straight Connector 17">
-            <a:extLst>
-              <a:ext uri="{FF2B5EF4-FFF2-40B4-BE49-F238E27FC236}">
-                <a16:creationId xmlns:a16="http://schemas.microsoft.com/office/drawing/2014/main" id="{A4095D5A-97E2-4A5F-ADBD-31D2EA768EF7}"/>
-              </a:ext>
-            </a:extLst>
-          </p:cNvPr>
-          <p:cNvCxnSpPr>
-            <a:cxnSpLocks/>
-          </p:cNvCxnSpPr>
-          <p:nvPr/>
-        </p:nvCxnSpPr>
-        <p:spPr>
-          <a:xfrm flipV="1">
-            <a:off x="4748168" y="1703129"/>
-            <a:ext cx="0" cy="411060"/>
-          </a:xfrm>
-          <a:prstGeom prst="line">
-            <a:avLst/>
-          </a:prstGeom>
-        </p:spPr>
-        <p:style>
-          <a:lnRef idx="2">
-            <a:schemeClr val="dk1"/>
-          </a:lnRef>
-          <a:fillRef idx="0">
-            <a:schemeClr val="dk1"/>
-          </a:fillRef>
-          <a:effectRef idx="1">
-            <a:schemeClr val="dk1"/>
-          </a:effectRef>
-          <a:fontRef idx="minor">
-            <a:schemeClr val="tx1"/>
-          </a:fontRef>
-        </p:style>
-      </p:cxnSp>
-      <p:cxnSp>
-        <p:nvCxnSpPr>
-          <p:cNvPr id="19" name="Straight Connector 18">
-            <a:extLst>
-              <a:ext uri="{FF2B5EF4-FFF2-40B4-BE49-F238E27FC236}">
-                <a16:creationId xmlns:a16="http://schemas.microsoft.com/office/drawing/2014/main" id="{CA3578AD-C36B-4EF3-A699-01954CCFB7F1}"/>
-              </a:ext>
-            </a:extLst>
-          </p:cNvPr>
-          <p:cNvCxnSpPr>
-            <a:cxnSpLocks/>
-          </p:cNvCxnSpPr>
-          <p:nvPr/>
-        </p:nvCxnSpPr>
-        <p:spPr>
-          <a:xfrm flipH="1">
-            <a:off x="4748168" y="2375483"/>
-            <a:ext cx="402671" cy="0"/>
-          </a:xfrm>
-          <a:prstGeom prst="line">
-            <a:avLst/>
-          </a:prstGeom>
-        </p:spPr>
-        <p:style>
-          <a:lnRef idx="2">
-            <a:schemeClr val="dk1"/>
-          </a:lnRef>
-          <a:fillRef idx="0">
-            <a:schemeClr val="dk1"/>
-          </a:fillRef>
-          <a:effectRef idx="1">
-            <a:schemeClr val="dk1"/>
-          </a:effectRef>
-          <a:fontRef idx="minor">
-            <a:schemeClr val="tx1"/>
-          </a:fontRef>
-        </p:style>
-      </p:cxnSp>
-      <p:cxnSp>
-        <p:nvCxnSpPr>
-          <p:cNvPr id="20" name="Straight Connector 19">
-            <a:extLst>
-              <a:ext uri="{FF2B5EF4-FFF2-40B4-BE49-F238E27FC236}">
-                <a16:creationId xmlns:a16="http://schemas.microsoft.com/office/drawing/2014/main" id="{4440DB3A-6CF5-49D6-A771-73DF4B1B8F3F}"/>
-              </a:ext>
-            </a:extLst>
-          </p:cNvPr>
-          <p:cNvCxnSpPr>
-            <a:cxnSpLocks/>
-          </p:cNvCxnSpPr>
-          <p:nvPr/>
-        </p:nvCxnSpPr>
-        <p:spPr>
-          <a:xfrm flipH="1">
-            <a:off x="4748168" y="2786543"/>
-            <a:ext cx="402671" cy="0"/>
-          </a:xfrm>
-          <a:prstGeom prst="line">
-            <a:avLst/>
-          </a:prstGeom>
-        </p:spPr>
-        <p:style>
-          <a:lnRef idx="2">
-            <a:schemeClr val="dk1"/>
-          </a:lnRef>
-          <a:fillRef idx="0">
-            <a:schemeClr val="dk1"/>
-          </a:fillRef>
-          <a:effectRef idx="1">
-            <a:schemeClr val="dk1"/>
-          </a:effectRef>
-          <a:fontRef idx="minor">
-            <a:schemeClr val="tx1"/>
-          </a:fontRef>
-        </p:style>
-      </p:cxnSp>
-      <p:cxnSp>
-        <p:nvCxnSpPr>
-          <p:cNvPr id="21" name="Straight Connector 20">
-            <a:extLst>
-              <a:ext uri="{FF2B5EF4-FFF2-40B4-BE49-F238E27FC236}">
-                <a16:creationId xmlns:a16="http://schemas.microsoft.com/office/drawing/2014/main" id="{A94085F2-B79D-490A-89D1-BFE3FF04AD75}"/>
-              </a:ext>
-            </a:extLst>
-          </p:cNvPr>
-          <p:cNvCxnSpPr>
-            <a:cxnSpLocks/>
-          </p:cNvCxnSpPr>
-          <p:nvPr/>
-        </p:nvCxnSpPr>
-        <p:spPr>
-          <a:xfrm flipV="1">
-            <a:off x="4748168" y="2375483"/>
-            <a:ext cx="0" cy="411060"/>
-          </a:xfrm>
-          <a:prstGeom prst="line">
-            <a:avLst/>
-          </a:prstGeom>
-        </p:spPr>
-        <p:style>
-          <a:lnRef idx="2">
-            <a:schemeClr val="dk1"/>
-          </a:lnRef>
-          <a:fillRef idx="0">
-            <a:schemeClr val="dk1"/>
-          </a:fillRef>
-          <a:effectRef idx="1">
-            <a:schemeClr val="dk1"/>
-          </a:effectRef>
-          <a:fontRef idx="minor">
-            <a:schemeClr val="tx1"/>
-          </a:fontRef>
-        </p:style>
-      </p:cxnSp>
-      <mc:AlternateContent xmlns:mc="http://schemas.openxmlformats.org/markup-compatibility/2006" xmlns:a14="http://schemas.microsoft.com/office/drawing/2010/main">
-        <mc:Choice Requires="a14">
+      <mc:AlternateContent xmlns:mc="http://schemas.openxmlformats.org/markup-compatibility/2006">
+        <mc:Choice xmlns:a14="http://schemas.microsoft.com/office/drawing/2010/main" Requires="a14">
           <p:sp>
             <p:nvSpPr>
-              <p:cNvPr id="23" name="TextBox 22">
+              <p:cNvPr id="40" name="TextBox 39">
                 <a:extLst>
                   <a:ext uri="{FF2B5EF4-FFF2-40B4-BE49-F238E27FC236}">
-                    <a16:creationId xmlns:a16="http://schemas.microsoft.com/office/drawing/2014/main" id="{7A14A1A2-4351-4068-914B-DD57A96B5DAB}"/>
+                    <a16:creationId xmlns:a16="http://schemas.microsoft.com/office/drawing/2014/main" id="{1F7C8746-AFF6-465F-8628-7468A202D2DF}"/>
                   </a:ext>
                 </a:extLst>
               </p:cNvPr>
@@ -3685,7 +3576,7 @@
             </p:nvSpPr>
             <p:spPr>
               <a:xfrm>
-                <a:off x="4748170" y="1032921"/>
+                <a:off x="544938" y="345451"/>
                 <a:ext cx="402669" cy="369332"/>
               </a:xfrm>
               <a:prstGeom prst="rect">
@@ -3716,10 +3607,13 @@
                         </m:sSubPr>
                         <m:e>
                           <m:r>
-                            <a:rPr lang="en-US" b="0" i="1" smtClean="0">
+                            <m:rPr>
+                              <m:sty m:val="p"/>
+                            </m:rPr>
+                            <a:rPr lang="el-GR" b="0" i="1" smtClean="0">
                               <a:latin typeface="Cambria Math" panose="02040503050406030204" pitchFamily="18" charset="0"/>
                             </a:rPr>
-                            <m:t>𝐶</m:t>
+                            <m:t>λ</m:t>
                           </m:r>
                         </m:e>
                         <m:sub>
@@ -3727,7 +3621,7 @@
                             <a:rPr lang="en-US" b="0" i="1" smtClean="0">
                               <a:latin typeface="Cambria Math" panose="02040503050406030204" pitchFamily="18" charset="0"/>
                             </a:rPr>
-                            <m:t>1</m:t>
+                            <m:t>𝐴</m:t>
                           </m:r>
                         </m:sub>
                       </m:sSub>
@@ -3739,13 +3633,13 @@
             </p:txBody>
           </p:sp>
         </mc:Choice>
-        <mc:Fallback xmlns="">
+        <mc:Fallback>
           <p:sp>
             <p:nvSpPr>
-              <p:cNvPr id="23" name="TextBox 22">
+              <p:cNvPr id="40" name="TextBox 39">
                 <a:extLst>
                   <a:ext uri="{FF2B5EF4-FFF2-40B4-BE49-F238E27FC236}">
-                    <a16:creationId xmlns:a16="http://schemas.microsoft.com/office/drawing/2014/main" id="{7A14A1A2-4351-4068-914B-DD57A96B5DAB}"/>
+                    <a16:creationId xmlns:a16="http://schemas.microsoft.com/office/drawing/2014/main" id="{1F7C8746-AFF6-465F-8628-7468A202D2DF}"/>
                   </a:ext>
                 </a:extLst>
               </p:cNvPr>
@@ -3756,7 +3650,7 @@
             </p:nvSpPr>
             <p:spPr>
               <a:xfrm>
-                <a:off x="4748170" y="1032921"/>
+                <a:off x="544938" y="345451"/>
                 <a:ext cx="402669" cy="369332"/>
               </a:xfrm>
               <a:prstGeom prst="rect">
@@ -3784,242 +3678,12 @@
           </p:sp>
         </mc:Fallback>
       </mc:AlternateContent>
-      <mc:AlternateContent xmlns:mc="http://schemas.openxmlformats.org/markup-compatibility/2006" xmlns:a14="http://schemas.microsoft.com/office/drawing/2010/main">
-        <mc:Choice Requires="a14">
-          <p:sp>
-            <p:nvSpPr>
-              <p:cNvPr id="24" name="TextBox 23">
-                <a:extLst>
-                  <a:ext uri="{FF2B5EF4-FFF2-40B4-BE49-F238E27FC236}">
-                    <a16:creationId xmlns:a16="http://schemas.microsoft.com/office/drawing/2014/main" id="{B114F4B0-08CF-498C-B30B-DD31A0C02436}"/>
-                  </a:ext>
-                </a:extLst>
-              </p:cNvPr>
-              <p:cNvSpPr txBox="1"/>
-              <p:nvPr/>
-            </p:nvSpPr>
-            <p:spPr>
-              <a:xfrm>
-                <a:off x="4748170" y="1712592"/>
-                <a:ext cx="402669" cy="369332"/>
-              </a:xfrm>
-              <a:prstGeom prst="rect">
-                <a:avLst/>
-              </a:prstGeom>
-              <a:noFill/>
-            </p:spPr>
-            <p:txBody>
-              <a:bodyPr wrap="square" rtlCol="0">
-                <a:spAutoFit/>
-              </a:bodyPr>
-              <a:lstStyle/>
-              <a:p>
-                <a:pPr/>
-                <a14:m>
-                  <m:oMathPara xmlns:m="http://schemas.openxmlformats.org/officeDocument/2006/math">
-                    <m:oMathParaPr>
-                      <m:jc m:val="centerGroup"/>
-                    </m:oMathParaPr>
-                    <m:oMath xmlns:m="http://schemas.openxmlformats.org/officeDocument/2006/math">
-                      <m:sSub>
-                        <m:sSubPr>
-                          <m:ctrlPr>
-                            <a:rPr lang="en-US" i="1" smtClean="0">
-                              <a:latin typeface="Cambria Math" panose="02040503050406030204" pitchFamily="18" charset="0"/>
-                            </a:rPr>
-                          </m:ctrlPr>
-                        </m:sSubPr>
-                        <m:e>
-                          <m:r>
-                            <a:rPr lang="en-US" b="0" i="1" smtClean="0">
-                              <a:latin typeface="Cambria Math" panose="02040503050406030204" pitchFamily="18" charset="0"/>
-                            </a:rPr>
-                            <m:t>𝐶</m:t>
-                          </m:r>
-                        </m:e>
-                        <m:sub>
-                          <m:r>
-                            <a:rPr lang="en-US" b="0" i="1" smtClean="0">
-                              <a:latin typeface="Cambria Math" panose="02040503050406030204" pitchFamily="18" charset="0"/>
-                            </a:rPr>
-                            <m:t>2</m:t>
-                          </m:r>
-                        </m:sub>
-                      </m:sSub>
-                    </m:oMath>
-                  </m:oMathPara>
-                </a14:m>
-                <a:endParaRPr lang="en-US" dirty="0"/>
-              </a:p>
-            </p:txBody>
-          </p:sp>
-        </mc:Choice>
-        <mc:Fallback xmlns="">
-          <p:sp>
-            <p:nvSpPr>
-              <p:cNvPr id="24" name="TextBox 23">
-                <a:extLst>
-                  <a:ext uri="{FF2B5EF4-FFF2-40B4-BE49-F238E27FC236}">
-                    <a16:creationId xmlns:a16="http://schemas.microsoft.com/office/drawing/2014/main" id="{B114F4B0-08CF-498C-B30B-DD31A0C02436}"/>
-                  </a:ext>
-                </a:extLst>
-              </p:cNvPr>
-              <p:cNvSpPr txBox="1">
-                <a:spLocks noRot="1" noChangeAspect="1" noMove="1" noResize="1" noEditPoints="1" noAdjustHandles="1" noChangeArrowheads="1" noChangeShapeType="1" noTextEdit="1"/>
-              </p:cNvSpPr>
-              <p:nvPr/>
-            </p:nvSpPr>
-            <p:spPr>
-              <a:xfrm>
-                <a:off x="4748170" y="1712592"/>
-                <a:ext cx="402669" cy="369332"/>
-              </a:xfrm>
-              <a:prstGeom prst="rect">
-                <a:avLst/>
-              </a:prstGeom>
-              <a:blipFill>
-                <a:blip r:embed="rId3"/>
-                <a:stretch>
-                  <a:fillRect/>
-                </a:stretch>
-              </a:blipFill>
-            </p:spPr>
-            <p:txBody>
-              <a:bodyPr/>
-              <a:lstStyle/>
-              <a:p>
-                <a:r>
-                  <a:rPr lang="en-US">
-                    <a:noFill/>
-                  </a:rPr>
-                  <a:t> </a:t>
-                </a:r>
-              </a:p>
-            </p:txBody>
-          </p:sp>
-        </mc:Fallback>
-      </mc:AlternateContent>
-      <mc:AlternateContent xmlns:mc="http://schemas.openxmlformats.org/markup-compatibility/2006" xmlns:a14="http://schemas.microsoft.com/office/drawing/2010/main">
-        <mc:Choice Requires="a14">
-          <p:sp>
-            <p:nvSpPr>
-              <p:cNvPr id="25" name="TextBox 24">
-                <a:extLst>
-                  <a:ext uri="{FF2B5EF4-FFF2-40B4-BE49-F238E27FC236}">
-                    <a16:creationId xmlns:a16="http://schemas.microsoft.com/office/drawing/2014/main" id="{B5F0BDF2-A03D-44A1-9F92-28744CE36CFB}"/>
-                  </a:ext>
-                </a:extLst>
-              </p:cNvPr>
-              <p:cNvSpPr txBox="1"/>
-              <p:nvPr/>
-            </p:nvSpPr>
-            <p:spPr>
-              <a:xfrm>
-                <a:off x="4748170" y="2367741"/>
-                <a:ext cx="402669" cy="369332"/>
-              </a:xfrm>
-              <a:prstGeom prst="rect">
-                <a:avLst/>
-              </a:prstGeom>
-              <a:noFill/>
-            </p:spPr>
-            <p:txBody>
-              <a:bodyPr wrap="square" rtlCol="0">
-                <a:spAutoFit/>
-              </a:bodyPr>
-              <a:lstStyle/>
-              <a:p>
-                <a:pPr/>
-                <a14:m>
-                  <m:oMathPara xmlns:m="http://schemas.openxmlformats.org/officeDocument/2006/math">
-                    <m:oMathParaPr>
-                      <m:jc m:val="centerGroup"/>
-                    </m:oMathParaPr>
-                    <m:oMath xmlns:m="http://schemas.openxmlformats.org/officeDocument/2006/math">
-                      <m:sSub>
-                        <m:sSubPr>
-                          <m:ctrlPr>
-                            <a:rPr lang="en-US" i="1" smtClean="0">
-                              <a:latin typeface="Cambria Math" panose="02040503050406030204" pitchFamily="18" charset="0"/>
-                            </a:rPr>
-                          </m:ctrlPr>
-                        </m:sSubPr>
-                        <m:e>
-                          <m:r>
-                            <a:rPr lang="en-US" b="0" i="1" smtClean="0">
-                              <a:latin typeface="Cambria Math" panose="02040503050406030204" pitchFamily="18" charset="0"/>
-                            </a:rPr>
-                            <m:t>𝐶</m:t>
-                          </m:r>
-                        </m:e>
-                        <m:sub>
-                          <m:r>
-                            <a:rPr lang="en-US" b="0" i="1" smtClean="0">
-                              <a:latin typeface="Cambria Math" panose="02040503050406030204" pitchFamily="18" charset="0"/>
-                            </a:rPr>
-                            <m:t>3</m:t>
-                          </m:r>
-                        </m:sub>
-                      </m:sSub>
-                    </m:oMath>
-                  </m:oMathPara>
-                </a14:m>
-                <a:endParaRPr lang="en-US" dirty="0"/>
-              </a:p>
-            </p:txBody>
-          </p:sp>
-        </mc:Choice>
-        <mc:Fallback xmlns="">
-          <p:sp>
-            <p:nvSpPr>
-              <p:cNvPr id="25" name="TextBox 24">
-                <a:extLst>
-                  <a:ext uri="{FF2B5EF4-FFF2-40B4-BE49-F238E27FC236}">
-                    <a16:creationId xmlns:a16="http://schemas.microsoft.com/office/drawing/2014/main" id="{B5F0BDF2-A03D-44A1-9F92-28744CE36CFB}"/>
-                  </a:ext>
-                </a:extLst>
-              </p:cNvPr>
-              <p:cNvSpPr txBox="1">
-                <a:spLocks noRot="1" noChangeAspect="1" noMove="1" noResize="1" noEditPoints="1" noAdjustHandles="1" noChangeArrowheads="1" noChangeShapeType="1" noTextEdit="1"/>
-              </p:cNvSpPr>
-              <p:nvPr/>
-            </p:nvSpPr>
-            <p:spPr>
-              <a:xfrm>
-                <a:off x="4748170" y="2367741"/>
-                <a:ext cx="402669" cy="369332"/>
-              </a:xfrm>
-              <a:prstGeom prst="rect">
-                <a:avLst/>
-              </a:prstGeom>
-              <a:blipFill>
-                <a:blip r:embed="rId4"/>
-                <a:stretch>
-                  <a:fillRect/>
-                </a:stretch>
-              </a:blipFill>
-            </p:spPr>
-            <p:txBody>
-              <a:bodyPr/>
-              <a:lstStyle/>
-              <a:p>
-                <a:r>
-                  <a:rPr lang="en-US">
-                    <a:noFill/>
-                  </a:rPr>
-                  <a:t> </a:t>
-                </a:r>
-              </a:p>
-            </p:txBody>
-          </p:sp>
-        </mc:Fallback>
-      </mc:AlternateContent>
-      <p:sp>
-        <p:nvSpPr>
-          <p:cNvPr id="26" name="TextBox 25">
-            <a:extLst>
-              <a:ext uri="{FF2B5EF4-FFF2-40B4-BE49-F238E27FC236}">
-                <a16:creationId xmlns:a16="http://schemas.microsoft.com/office/drawing/2014/main" id="{0889A26B-6EB9-4C8F-8E72-AB8AF5E93917}"/>
+      <p:sp>
+        <p:nvSpPr>
+          <p:cNvPr id="22" name="TextBox 21">
+            <a:extLst>
+              <a:ext uri="{FF2B5EF4-FFF2-40B4-BE49-F238E27FC236}">
+                <a16:creationId xmlns:a16="http://schemas.microsoft.com/office/drawing/2014/main" id="{D1E577D8-E378-4BF8-B91B-BCDABA0686C0}"/>
               </a:ext>
             </a:extLst>
           </p:cNvPr>
@@ -4028,7 +3692,7 @@
         </p:nvSpPr>
         <p:spPr>
           <a:xfrm>
-            <a:off x="2195819" y="1897258"/>
+            <a:off x="1156983" y="547916"/>
             <a:ext cx="1111542" cy="369332"/>
           </a:xfrm>
           <a:prstGeom prst="rect">
@@ -4044,30 +3708,30 @@
           <a:p>
             <a:r>
               <a:rPr lang="en-US" dirty="0"/>
-              <a:t>XXX…XXX</a:t>
+              <a:t>XX…XX</a:t>
             </a:r>
           </a:p>
         </p:txBody>
       </p:sp>
       <p:cxnSp>
         <p:nvCxnSpPr>
-          <p:cNvPr id="28" name="Straight Arrow Connector 27">
-            <a:extLst>
-              <a:ext uri="{FF2B5EF4-FFF2-40B4-BE49-F238E27FC236}">
-                <a16:creationId xmlns:a16="http://schemas.microsoft.com/office/drawing/2014/main" id="{57D7A336-8854-4EB0-BF58-207EB14F2226}"/>
+          <p:cNvPr id="27" name="Straight Arrow Connector 26">
+            <a:extLst>
+              <a:ext uri="{FF2B5EF4-FFF2-40B4-BE49-F238E27FC236}">
+                <a16:creationId xmlns:a16="http://schemas.microsoft.com/office/drawing/2014/main" id="{DE5720ED-BE24-4B32-93C7-2ADE2E091DB5}"/>
               </a:ext>
             </a:extLst>
           </p:cNvPr>
           <p:cNvCxnSpPr>
             <a:cxnSpLocks/>
-            <a:endCxn id="26" idx="1"/>
+            <a:endCxn id="22" idx="1"/>
           </p:cNvCxnSpPr>
           <p:nvPr/>
         </p:nvCxnSpPr>
         <p:spPr>
           <a:xfrm>
-            <a:off x="1258349" y="2081924"/>
-            <a:ext cx="937470" cy="0"/>
+            <a:off x="738231" y="732582"/>
+            <a:ext cx="418752" cy="0"/>
           </a:xfrm>
           <a:prstGeom prst="straightConnector1">
             <a:avLst/>
@@ -4084,6 +3748,192 @@
             <a:schemeClr val="dk1"/>
           </a:fillRef>
           <a:effectRef idx="0">
+            <a:schemeClr val="dk1"/>
+          </a:effectRef>
+          <a:fontRef idx="minor">
+            <a:schemeClr val="tx1"/>
+          </a:fontRef>
+        </p:style>
+      </p:cxnSp>
+      <p:sp>
+        <p:nvSpPr>
+          <p:cNvPr id="29" name="TextBox 28">
+            <a:extLst>
+              <a:ext uri="{FF2B5EF4-FFF2-40B4-BE49-F238E27FC236}">
+                <a16:creationId xmlns:a16="http://schemas.microsoft.com/office/drawing/2014/main" id="{D870FA83-EC5D-4C9D-BF0F-96FF1B97BB8C}"/>
+              </a:ext>
+            </a:extLst>
+          </p:cNvPr>
+          <p:cNvSpPr txBox="1"/>
+          <p:nvPr/>
+        </p:nvSpPr>
+        <p:spPr>
+          <a:xfrm>
+            <a:off x="1156983" y="204341"/>
+            <a:ext cx="1010177" cy="369332"/>
+          </a:xfrm>
+          <a:prstGeom prst="rect">
+            <a:avLst/>
+          </a:prstGeom>
+          <a:noFill/>
+        </p:spPr>
+        <p:txBody>
+          <a:bodyPr wrap="square" rtlCol="0">
+            <a:spAutoFit/>
+          </a:bodyPr>
+          <a:lstStyle/>
+          <a:p>
+            <a:pPr/>
+            <a:r>
+              <a:rPr lang="en-US" dirty="0"/>
+              <a:t>Outside</a:t>
+            </a:r>
+          </a:p>
+        </p:txBody>
+      </p:sp>
+      <p:sp>
+        <p:nvSpPr>
+          <p:cNvPr id="30" name="TextBox 29">
+            <a:extLst>
+              <a:ext uri="{FF2B5EF4-FFF2-40B4-BE49-F238E27FC236}">
+                <a16:creationId xmlns:a16="http://schemas.microsoft.com/office/drawing/2014/main" id="{42567C67-FDE1-4F43-BE50-D1258E3A67BE}"/>
+              </a:ext>
+            </a:extLst>
+          </p:cNvPr>
+          <p:cNvSpPr txBox="1"/>
+          <p:nvPr/>
+        </p:nvSpPr>
+        <p:spPr>
+          <a:xfrm>
+            <a:off x="2810312" y="208586"/>
+            <a:ext cx="757108" cy="369332"/>
+          </a:xfrm>
+          <a:prstGeom prst="rect">
+            <a:avLst/>
+          </a:prstGeom>
+          <a:noFill/>
+        </p:spPr>
+        <p:txBody>
+          <a:bodyPr wrap="square" rtlCol="0">
+            <a:spAutoFit/>
+          </a:bodyPr>
+          <a:lstStyle/>
+          <a:p>
+            <a:pPr/>
+            <a:r>
+              <a:rPr lang="en-US" dirty="0"/>
+              <a:t>Inside</a:t>
+            </a:r>
+          </a:p>
+        </p:txBody>
+      </p:sp>
+      <p:cxnSp>
+        <p:nvCxnSpPr>
+          <p:cNvPr id="32" name="Straight Arrow Connector 31">
+            <a:extLst>
+              <a:ext uri="{FF2B5EF4-FFF2-40B4-BE49-F238E27FC236}">
+                <a16:creationId xmlns:a16="http://schemas.microsoft.com/office/drawing/2014/main" id="{E98F79A9-2A30-4DA2-8392-F799917E5540}"/>
+              </a:ext>
+            </a:extLst>
+          </p:cNvPr>
+          <p:cNvCxnSpPr>
+            <a:cxnSpLocks/>
+          </p:cNvCxnSpPr>
+          <p:nvPr/>
+        </p:nvCxnSpPr>
+        <p:spPr>
+          <a:xfrm>
+            <a:off x="2268525" y="702143"/>
+            <a:ext cx="418752" cy="0"/>
+          </a:xfrm>
+          <a:prstGeom prst="straightConnector1">
+            <a:avLst/>
+          </a:prstGeom>
+          <a:ln>
+            <a:tailEnd type="triangle"/>
+          </a:ln>
+        </p:spPr>
+        <p:style>
+          <a:lnRef idx="1">
+            <a:schemeClr val="dk1"/>
+          </a:lnRef>
+          <a:fillRef idx="0">
+            <a:schemeClr val="dk1"/>
+          </a:fillRef>
+          <a:effectRef idx="0">
+            <a:schemeClr val="dk1"/>
+          </a:effectRef>
+          <a:fontRef idx="minor">
+            <a:schemeClr val="tx1"/>
+          </a:fontRef>
+        </p:style>
+      </p:cxnSp>
+      <p:sp>
+        <p:nvSpPr>
+          <p:cNvPr id="34" name="TextBox 33">
+            <a:extLst>
+              <a:ext uri="{FF2B5EF4-FFF2-40B4-BE49-F238E27FC236}">
+                <a16:creationId xmlns:a16="http://schemas.microsoft.com/office/drawing/2014/main" id="{8AB03A43-9CE8-46C2-91A3-A50522B25440}"/>
+              </a:ext>
+            </a:extLst>
+          </p:cNvPr>
+          <p:cNvSpPr txBox="1"/>
+          <p:nvPr/>
+        </p:nvSpPr>
+        <p:spPr>
+          <a:xfrm>
+            <a:off x="2751590" y="534120"/>
+            <a:ext cx="1111542" cy="369332"/>
+          </a:xfrm>
+          <a:prstGeom prst="rect">
+            <a:avLst/>
+          </a:prstGeom>
+          <a:noFill/>
+        </p:spPr>
+        <p:txBody>
+          <a:bodyPr wrap="square" rtlCol="0">
+            <a:spAutoFit/>
+          </a:bodyPr>
+          <a:lstStyle/>
+          <a:p>
+            <a:r>
+              <a:rPr lang="en-US" dirty="0"/>
+              <a:t>XX…XX</a:t>
+            </a:r>
+          </a:p>
+        </p:txBody>
+      </p:sp>
+      <p:cxnSp>
+        <p:nvCxnSpPr>
+          <p:cNvPr id="37" name="Straight Connector 36">
+            <a:extLst>
+              <a:ext uri="{FF2B5EF4-FFF2-40B4-BE49-F238E27FC236}">
+                <a16:creationId xmlns:a16="http://schemas.microsoft.com/office/drawing/2014/main" id="{15D91749-E025-4C7B-A05C-2EA56913927E}"/>
+              </a:ext>
+            </a:extLst>
+          </p:cNvPr>
+          <p:cNvCxnSpPr>
+            <a:cxnSpLocks/>
+          </p:cNvCxnSpPr>
+          <p:nvPr/>
+        </p:nvCxnSpPr>
+        <p:spPr>
+          <a:xfrm flipH="1">
+            <a:off x="7507436" y="6310297"/>
+            <a:ext cx="1057013" cy="0"/>
+          </a:xfrm>
+          <a:prstGeom prst="line">
+            <a:avLst/>
+          </a:prstGeom>
+        </p:spPr>
+        <p:style>
+          <a:lnRef idx="2">
+            <a:schemeClr val="dk1"/>
+          </a:lnRef>
+          <a:fillRef idx="0">
+            <a:schemeClr val="dk1"/>
+          </a:fillRef>
+          <a:effectRef idx="1">
             <a:schemeClr val="dk1"/>
           </a:effectRef>
           <a:fontRef idx="minor">
@@ -4093,39 +3943,35 @@
       </p:cxnSp>
       <p:cxnSp>
         <p:nvCxnSpPr>
-          <p:cNvPr id="31" name="Straight Arrow Connector 30">
-            <a:extLst>
-              <a:ext uri="{FF2B5EF4-FFF2-40B4-BE49-F238E27FC236}">
-                <a16:creationId xmlns:a16="http://schemas.microsoft.com/office/drawing/2014/main" id="{E3E425DE-7C37-4329-9ABD-043254DBFB8D}"/>
+          <p:cNvPr id="38" name="Straight Connector 37">
+            <a:extLst>
+              <a:ext uri="{FF2B5EF4-FFF2-40B4-BE49-F238E27FC236}">
+                <a16:creationId xmlns:a16="http://schemas.microsoft.com/office/drawing/2014/main" id="{01A0004B-8A7C-434B-BA92-F7B76BE24B9A}"/>
               </a:ext>
             </a:extLst>
           </p:cNvPr>
           <p:cNvCxnSpPr>
             <a:cxnSpLocks/>
-            <a:stCxn id="26" idx="3"/>
           </p:cNvCxnSpPr>
           <p:nvPr/>
         </p:nvCxnSpPr>
         <p:spPr>
           <a:xfrm flipV="1">
-            <a:off x="3307361" y="1228987"/>
-            <a:ext cx="1247861" cy="852937"/>
-          </a:xfrm>
-          <a:prstGeom prst="straightConnector1">
+            <a:off x="8564449" y="6322986"/>
+            <a:ext cx="0" cy="398371"/>
+          </a:xfrm>
+          <a:prstGeom prst="line">
             <a:avLst/>
           </a:prstGeom>
-          <a:ln>
-            <a:tailEnd type="triangle"/>
-          </a:ln>
         </p:spPr>
         <p:style>
-          <a:lnRef idx="1">
+          <a:lnRef idx="2">
             <a:schemeClr val="dk1"/>
           </a:lnRef>
           <a:fillRef idx="0">
             <a:schemeClr val="dk1"/>
           </a:fillRef>
-          <a:effectRef idx="0">
+          <a:effectRef idx="1">
             <a:schemeClr val="dk1"/>
           </a:effectRef>
           <a:fontRef idx="minor">
@@ -4135,39 +3981,109 @@
       </p:cxnSp>
       <p:cxnSp>
         <p:nvCxnSpPr>
-          <p:cNvPr id="33" name="Straight Arrow Connector 32">
-            <a:extLst>
-              <a:ext uri="{FF2B5EF4-FFF2-40B4-BE49-F238E27FC236}">
-                <a16:creationId xmlns:a16="http://schemas.microsoft.com/office/drawing/2014/main" id="{3A7630DF-5972-4D11-B683-5E856BA96DF2}"/>
+          <p:cNvPr id="41" name="Straight Connector 40">
+            <a:extLst>
+              <a:ext uri="{FF2B5EF4-FFF2-40B4-BE49-F238E27FC236}">
+                <a16:creationId xmlns:a16="http://schemas.microsoft.com/office/drawing/2014/main" id="{55A24BC9-45A2-42F2-BC66-C160E7E7A28A}"/>
               </a:ext>
             </a:extLst>
           </p:cNvPr>
           <p:cNvCxnSpPr>
             <a:cxnSpLocks/>
-            <a:stCxn id="26" idx="3"/>
           </p:cNvCxnSpPr>
           <p:nvPr/>
         </p:nvCxnSpPr>
         <p:spPr>
           <a:xfrm flipV="1">
-            <a:off x="3307361" y="1897258"/>
-            <a:ext cx="1247861" cy="184666"/>
-          </a:xfrm>
-          <a:prstGeom prst="straightConnector1">
+            <a:off x="7507436" y="6310297"/>
+            <a:ext cx="0" cy="411060"/>
+          </a:xfrm>
+          <a:prstGeom prst="line">
             <a:avLst/>
           </a:prstGeom>
-          <a:ln>
-            <a:tailEnd type="triangle"/>
-          </a:ln>
         </p:spPr>
         <p:style>
-          <a:lnRef idx="1">
+          <a:lnRef idx="2">
             <a:schemeClr val="dk1"/>
           </a:lnRef>
           <a:fillRef idx="0">
             <a:schemeClr val="dk1"/>
           </a:fillRef>
-          <a:effectRef idx="0">
+          <a:effectRef idx="1">
+            <a:schemeClr val="dk1"/>
+          </a:effectRef>
+          <a:fontRef idx="minor">
+            <a:schemeClr val="tx1"/>
+          </a:fontRef>
+        </p:style>
+      </p:cxnSp>
+      <p:sp>
+        <p:nvSpPr>
+          <p:cNvPr id="42" name="TextBox 41">
+            <a:extLst>
+              <a:ext uri="{FF2B5EF4-FFF2-40B4-BE49-F238E27FC236}">
+                <a16:creationId xmlns:a16="http://schemas.microsoft.com/office/drawing/2014/main" id="{F7874172-8E37-4D16-9877-41D6A6FFDC37}"/>
+              </a:ext>
+            </a:extLst>
+          </p:cNvPr>
+          <p:cNvSpPr txBox="1"/>
+          <p:nvPr/>
+        </p:nvSpPr>
+        <p:spPr>
+          <a:xfrm>
+            <a:off x="7531205" y="6322986"/>
+            <a:ext cx="1007362" cy="369332"/>
+          </a:xfrm>
+          <a:prstGeom prst="rect">
+            <a:avLst/>
+          </a:prstGeom>
+          <a:noFill/>
+        </p:spPr>
+        <p:txBody>
+          <a:bodyPr wrap="square" rtlCol="0">
+            <a:spAutoFit/>
+          </a:bodyPr>
+          <a:lstStyle/>
+          <a:p>
+            <a:pPr algn="ctr"/>
+            <a:r>
+              <a:rPr lang="en-US" dirty="0"/>
+              <a:t>Cashier</a:t>
+            </a:r>
+          </a:p>
+        </p:txBody>
+      </p:sp>
+      <p:cxnSp>
+        <p:nvCxnSpPr>
+          <p:cNvPr id="43" name="Straight Connector 42">
+            <a:extLst>
+              <a:ext uri="{FF2B5EF4-FFF2-40B4-BE49-F238E27FC236}">
+                <a16:creationId xmlns:a16="http://schemas.microsoft.com/office/drawing/2014/main" id="{BDE2FAC4-DD5B-454F-AEB5-60C0D3CF6CAD}"/>
+              </a:ext>
+            </a:extLst>
+          </p:cNvPr>
+          <p:cNvCxnSpPr>
+            <a:cxnSpLocks/>
+          </p:cNvCxnSpPr>
+          <p:nvPr/>
+        </p:nvCxnSpPr>
+        <p:spPr>
+          <a:xfrm flipH="1">
+            <a:off x="6312680" y="4544418"/>
+            <a:ext cx="1057013" cy="0"/>
+          </a:xfrm>
+          <a:prstGeom prst="line">
+            <a:avLst/>
+          </a:prstGeom>
+        </p:spPr>
+        <p:style>
+          <a:lnRef idx="2">
+            <a:schemeClr val="dk1"/>
+          </a:lnRef>
+          <a:fillRef idx="0">
+            <a:schemeClr val="dk1"/>
+          </a:fillRef>
+          <a:effectRef idx="1">
             <a:schemeClr val="dk1"/>
           </a:effectRef>
           <a:fontRef idx="minor">
@@ -4177,23 +4093,134 @@
       </p:cxnSp>
       <p:cxnSp>
         <p:nvCxnSpPr>
-          <p:cNvPr id="36" name="Straight Arrow Connector 35">
-            <a:extLst>
-              <a:ext uri="{FF2B5EF4-FFF2-40B4-BE49-F238E27FC236}">
-                <a16:creationId xmlns:a16="http://schemas.microsoft.com/office/drawing/2014/main" id="{AAF583AF-4D2D-40C0-B9E3-AD5CD762F903}"/>
+          <p:cNvPr id="44" name="Straight Connector 43">
+            <a:extLst>
+              <a:ext uri="{FF2B5EF4-FFF2-40B4-BE49-F238E27FC236}">
+                <a16:creationId xmlns:a16="http://schemas.microsoft.com/office/drawing/2014/main" id="{C7D83138-E433-454A-9DB4-61E37022A134}"/>
               </a:ext>
             </a:extLst>
           </p:cNvPr>
           <p:cNvCxnSpPr>
             <a:cxnSpLocks/>
-            <a:stCxn id="26" idx="3"/>
           </p:cNvCxnSpPr>
           <p:nvPr/>
         </p:nvCxnSpPr>
         <p:spPr>
+          <a:xfrm flipV="1">
+            <a:off x="7369693" y="4557107"/>
+            <a:ext cx="0" cy="398371"/>
+          </a:xfrm>
+          <a:prstGeom prst="line">
+            <a:avLst/>
+          </a:prstGeom>
+        </p:spPr>
+        <p:style>
+          <a:lnRef idx="2">
+            <a:schemeClr val="dk1"/>
+          </a:lnRef>
+          <a:fillRef idx="0">
+            <a:schemeClr val="dk1"/>
+          </a:fillRef>
+          <a:effectRef idx="1">
+            <a:schemeClr val="dk1"/>
+          </a:effectRef>
+          <a:fontRef idx="minor">
+            <a:schemeClr val="tx1"/>
+          </a:fontRef>
+        </p:style>
+      </p:cxnSp>
+      <p:cxnSp>
+        <p:nvCxnSpPr>
+          <p:cNvPr id="45" name="Straight Connector 44">
+            <a:extLst>
+              <a:ext uri="{FF2B5EF4-FFF2-40B4-BE49-F238E27FC236}">
+                <a16:creationId xmlns:a16="http://schemas.microsoft.com/office/drawing/2014/main" id="{E916CCC2-1E9F-41B6-8A3A-CA3A6A0516C2}"/>
+              </a:ext>
+            </a:extLst>
+          </p:cNvPr>
+          <p:cNvCxnSpPr>
+            <a:cxnSpLocks/>
+          </p:cNvCxnSpPr>
+          <p:nvPr/>
+        </p:nvCxnSpPr>
+        <p:spPr>
+          <a:xfrm flipV="1">
+            <a:off x="6312680" y="4544418"/>
+            <a:ext cx="0" cy="411060"/>
+          </a:xfrm>
+          <a:prstGeom prst="line">
+            <a:avLst/>
+          </a:prstGeom>
+        </p:spPr>
+        <p:style>
+          <a:lnRef idx="2">
+            <a:schemeClr val="dk1"/>
+          </a:lnRef>
+          <a:fillRef idx="0">
+            <a:schemeClr val="dk1"/>
+          </a:fillRef>
+          <a:effectRef idx="1">
+            <a:schemeClr val="dk1"/>
+          </a:effectRef>
+          <a:fontRef idx="minor">
+            <a:schemeClr val="tx1"/>
+          </a:fontRef>
+        </p:style>
+      </p:cxnSp>
+      <p:sp>
+        <p:nvSpPr>
+          <p:cNvPr id="46" name="TextBox 45">
+            <a:extLst>
+              <a:ext uri="{FF2B5EF4-FFF2-40B4-BE49-F238E27FC236}">
+                <a16:creationId xmlns:a16="http://schemas.microsoft.com/office/drawing/2014/main" id="{7FDA582C-1CE1-4EF8-A2ED-670475DB4D83}"/>
+              </a:ext>
+            </a:extLst>
+          </p:cNvPr>
+          <p:cNvSpPr txBox="1"/>
+          <p:nvPr/>
+        </p:nvSpPr>
+        <p:spPr>
           <a:xfrm>
-            <a:off x="3307361" y="2081924"/>
-            <a:ext cx="1247861" cy="499089"/>
+            <a:off x="6336449" y="4557107"/>
+            <a:ext cx="1007362" cy="369332"/>
+          </a:xfrm>
+          <a:prstGeom prst="rect">
+            <a:avLst/>
+          </a:prstGeom>
+          <a:noFill/>
+        </p:spPr>
+        <p:txBody>
+          <a:bodyPr wrap="square" rtlCol="0">
+            <a:spAutoFit/>
+          </a:bodyPr>
+          <a:lstStyle/>
+          <a:p>
+            <a:pPr algn="ctr"/>
+            <a:r>
+              <a:rPr lang="en-US" dirty="0"/>
+              <a:t>Clerk</a:t>
+            </a:r>
+          </a:p>
+        </p:txBody>
+      </p:sp>
+      <p:cxnSp>
+        <p:nvCxnSpPr>
+          <p:cNvPr id="51" name="Straight Arrow Connector 50">
+            <a:extLst>
+              <a:ext uri="{FF2B5EF4-FFF2-40B4-BE49-F238E27FC236}">
+                <a16:creationId xmlns:a16="http://schemas.microsoft.com/office/drawing/2014/main" id="{8C823794-F796-48F9-8057-D790BD86CE25}"/>
+              </a:ext>
+            </a:extLst>
+          </p:cNvPr>
+          <p:cNvCxnSpPr>
+            <a:cxnSpLocks/>
+          </p:cNvCxnSpPr>
+          <p:nvPr/>
+        </p:nvCxnSpPr>
+        <p:spPr>
+          <a:xfrm>
+            <a:off x="7108270" y="5191525"/>
+            <a:ext cx="223708" cy="1118772"/>
           </a:xfrm>
           <a:prstGeom prst="straightConnector1">
             <a:avLst/>
@@ -4217,217 +4244,825 @@
           </a:fontRef>
         </p:style>
       </p:cxnSp>
-      <mc:AlternateContent xmlns:mc="http://schemas.openxmlformats.org/markup-compatibility/2006" xmlns:a14="http://schemas.microsoft.com/office/drawing/2010/main">
-        <mc:Choice Requires="a14">
-          <p:sp>
-            <p:nvSpPr>
-              <p:cNvPr id="39" name="TextBox 38">
-                <a:extLst>
-                  <a:ext uri="{FF2B5EF4-FFF2-40B4-BE49-F238E27FC236}">
-                    <a16:creationId xmlns:a16="http://schemas.microsoft.com/office/drawing/2014/main" id="{DAA56C9B-461F-41A2-B889-8A950FE66DFC}"/>
-                  </a:ext>
-                </a:extLst>
-              </p:cNvPr>
-              <p:cNvSpPr txBox="1"/>
-              <p:nvPr/>
-            </p:nvSpPr>
-            <p:spPr>
-              <a:xfrm>
-                <a:off x="2550253" y="1510127"/>
-                <a:ext cx="293615" cy="369332"/>
-              </a:xfrm>
-              <a:prstGeom prst="rect">
-                <a:avLst/>
-              </a:prstGeom>
-              <a:noFill/>
-            </p:spPr>
-            <p:txBody>
-              <a:bodyPr wrap="square" rtlCol="0">
-                <a:spAutoFit/>
-              </a:bodyPr>
-              <a:lstStyle/>
-              <a:p>
-                <a:pPr/>
-                <a14:m>
-                  <m:oMathPara xmlns:m="http://schemas.openxmlformats.org/officeDocument/2006/math">
-                    <m:oMathParaPr>
-                      <m:jc m:val="centerGroup"/>
-                    </m:oMathParaPr>
-                    <m:oMath xmlns:m="http://schemas.openxmlformats.org/officeDocument/2006/math">
-                      <m:r>
-                        <a:rPr lang="en-US" b="0" i="1" smtClean="0">
-                          <a:latin typeface="Cambria Math" panose="02040503050406030204" pitchFamily="18" charset="0"/>
-                        </a:rPr>
-                        <m:t>𝐵</m:t>
-                      </m:r>
-                    </m:oMath>
-                  </m:oMathPara>
-                </a14:m>
-                <a:endParaRPr lang="en-US" dirty="0"/>
-              </a:p>
-            </p:txBody>
-          </p:sp>
-        </mc:Choice>
-        <mc:Fallback xmlns="">
-          <p:sp>
-            <p:nvSpPr>
-              <p:cNvPr id="39" name="TextBox 38">
-                <a:extLst>
-                  <a:ext uri="{FF2B5EF4-FFF2-40B4-BE49-F238E27FC236}">
-                    <a16:creationId xmlns:a16="http://schemas.microsoft.com/office/drawing/2014/main" id="{DAA56C9B-461F-41A2-B889-8A950FE66DFC}"/>
-                  </a:ext>
-                </a:extLst>
-              </p:cNvPr>
-              <p:cNvSpPr txBox="1">
-                <a:spLocks noRot="1" noChangeAspect="1" noMove="1" noResize="1" noEditPoints="1" noAdjustHandles="1" noChangeArrowheads="1" noChangeShapeType="1" noTextEdit="1"/>
-              </p:cNvSpPr>
-              <p:nvPr/>
-            </p:nvSpPr>
-            <p:spPr>
-              <a:xfrm>
-                <a:off x="2550253" y="1510127"/>
-                <a:ext cx="293615" cy="369332"/>
-              </a:xfrm>
-              <a:prstGeom prst="rect">
-                <a:avLst/>
-              </a:prstGeom>
-              <a:blipFill>
-                <a:blip r:embed="rId5"/>
-                <a:stretch>
-                  <a:fillRect r="-10204"/>
-                </a:stretch>
-              </a:blipFill>
-            </p:spPr>
-            <p:txBody>
-              <a:bodyPr/>
-              <a:lstStyle/>
-              <a:p>
-                <a:r>
-                  <a:rPr lang="en-US">
-                    <a:noFill/>
-                  </a:rPr>
-                  <a:t> </a:t>
-                </a:r>
-              </a:p>
-            </p:txBody>
-          </p:sp>
-        </mc:Fallback>
-      </mc:AlternateContent>
-      <mc:AlternateContent xmlns:mc="http://schemas.openxmlformats.org/markup-compatibility/2006" xmlns:a14="http://schemas.microsoft.com/office/drawing/2010/main">
-        <mc:Choice Requires="a14">
-          <p:sp>
-            <p:nvSpPr>
-              <p:cNvPr id="40" name="TextBox 39">
-                <a:extLst>
-                  <a:ext uri="{FF2B5EF4-FFF2-40B4-BE49-F238E27FC236}">
-                    <a16:creationId xmlns:a16="http://schemas.microsoft.com/office/drawing/2014/main" id="{1F7C8746-AFF6-465F-8628-7468A202D2DF}"/>
-                  </a:ext>
-                </a:extLst>
-              </p:cNvPr>
-              <p:cNvSpPr txBox="1"/>
-              <p:nvPr/>
-            </p:nvSpPr>
-            <p:spPr>
-              <a:xfrm>
-                <a:off x="947958" y="1638302"/>
-                <a:ext cx="402669" cy="369332"/>
-              </a:xfrm>
-              <a:prstGeom prst="rect">
-                <a:avLst/>
-              </a:prstGeom>
-              <a:noFill/>
-            </p:spPr>
-            <p:txBody>
-              <a:bodyPr wrap="square" rtlCol="0">
-                <a:spAutoFit/>
-              </a:bodyPr>
-              <a:lstStyle/>
-              <a:p>
-                <a:pPr/>
-                <a14:m>
-                  <m:oMathPara xmlns:m="http://schemas.openxmlformats.org/officeDocument/2006/math">
-                    <m:oMathParaPr>
-                      <m:jc m:val="centerGroup"/>
-                    </m:oMathParaPr>
-                    <m:oMath xmlns:m="http://schemas.openxmlformats.org/officeDocument/2006/math">
-                      <m:sSub>
-                        <m:sSubPr>
-                          <m:ctrlPr>
-                            <a:rPr lang="en-US" i="1" smtClean="0">
-                              <a:latin typeface="Cambria Math" panose="02040503050406030204" pitchFamily="18" charset="0"/>
-                            </a:rPr>
-                          </m:ctrlPr>
-                        </m:sSubPr>
-                        <m:e>
-                          <m:r>
-                            <a:rPr lang="en-US" b="0" i="1" smtClean="0">
-                              <a:latin typeface="Cambria Math" panose="02040503050406030204" pitchFamily="18" charset="0"/>
-                            </a:rPr>
-                            <m:t>𝑇</m:t>
-                          </m:r>
-                        </m:e>
-                        <m:sub>
-                          <m:r>
-                            <a:rPr lang="en-US" b="0" i="1" smtClean="0">
-                              <a:latin typeface="Cambria Math" panose="02040503050406030204" pitchFamily="18" charset="0"/>
-                            </a:rPr>
-                            <m:t>𝐴</m:t>
-                          </m:r>
-                        </m:sub>
-                      </m:sSub>
-                    </m:oMath>
-                  </m:oMathPara>
-                </a14:m>
-                <a:endParaRPr lang="en-US" dirty="0"/>
-              </a:p>
-            </p:txBody>
-          </p:sp>
-        </mc:Choice>
-        <mc:Fallback xmlns="">
-          <p:sp>
-            <p:nvSpPr>
-              <p:cNvPr id="40" name="TextBox 39">
-                <a:extLst>
-                  <a:ext uri="{FF2B5EF4-FFF2-40B4-BE49-F238E27FC236}">
-                    <a16:creationId xmlns:a16="http://schemas.microsoft.com/office/drawing/2014/main" id="{1F7C8746-AFF6-465F-8628-7468A202D2DF}"/>
-                  </a:ext>
-                </a:extLst>
-              </p:cNvPr>
-              <p:cNvSpPr txBox="1">
-                <a:spLocks noRot="1" noChangeAspect="1" noMove="1" noResize="1" noEditPoints="1" noAdjustHandles="1" noChangeArrowheads="1" noChangeShapeType="1" noTextEdit="1"/>
-              </p:cNvSpPr>
-              <p:nvPr/>
-            </p:nvSpPr>
-            <p:spPr>
-              <a:xfrm>
-                <a:off x="947958" y="1638302"/>
-                <a:ext cx="402669" cy="369332"/>
-              </a:xfrm>
-              <a:prstGeom prst="rect">
-                <a:avLst/>
-              </a:prstGeom>
-              <a:blipFill>
-                <a:blip r:embed="rId6"/>
-                <a:stretch>
-                  <a:fillRect/>
-                </a:stretch>
-              </a:blipFill>
-            </p:spPr>
-            <p:txBody>
-              <a:bodyPr/>
-              <a:lstStyle/>
-              <a:p>
-                <a:r>
-                  <a:rPr lang="en-US">
-                    <a:noFill/>
-                  </a:rPr>
-                  <a:t> </a:t>
-                </a:r>
-              </a:p>
-            </p:txBody>
-          </p:sp>
-        </mc:Fallback>
-      </mc:AlternateContent>
+      <p:cxnSp>
+        <p:nvCxnSpPr>
+          <p:cNvPr id="61" name="Straight Connector 60">
+            <a:extLst>
+              <a:ext uri="{FF2B5EF4-FFF2-40B4-BE49-F238E27FC236}">
+                <a16:creationId xmlns:a16="http://schemas.microsoft.com/office/drawing/2014/main" id="{17DCD664-C6EE-4892-A65C-0BC7E3325664}"/>
+              </a:ext>
+            </a:extLst>
+          </p:cNvPr>
+          <p:cNvCxnSpPr>
+            <a:cxnSpLocks/>
+          </p:cNvCxnSpPr>
+          <p:nvPr/>
+        </p:nvCxnSpPr>
+        <p:spPr>
+          <a:xfrm flipH="1">
+            <a:off x="9889921" y="2157369"/>
+            <a:ext cx="1359000" cy="0"/>
+          </a:xfrm>
+          <a:prstGeom prst="line">
+            <a:avLst/>
+          </a:prstGeom>
+        </p:spPr>
+        <p:style>
+          <a:lnRef idx="2">
+            <a:schemeClr val="dk1"/>
+          </a:lnRef>
+          <a:fillRef idx="0">
+            <a:schemeClr val="dk1"/>
+          </a:fillRef>
+          <a:effectRef idx="1">
+            <a:schemeClr val="dk1"/>
+          </a:effectRef>
+          <a:fontRef idx="minor">
+            <a:schemeClr val="tx1"/>
+          </a:fontRef>
+        </p:style>
+      </p:cxnSp>
+      <p:cxnSp>
+        <p:nvCxnSpPr>
+          <p:cNvPr id="62" name="Straight Connector 61">
+            <a:extLst>
+              <a:ext uri="{FF2B5EF4-FFF2-40B4-BE49-F238E27FC236}">
+                <a16:creationId xmlns:a16="http://schemas.microsoft.com/office/drawing/2014/main" id="{8EB6232B-F393-4C5E-ADF4-9C777B65F02B}"/>
+              </a:ext>
+            </a:extLst>
+          </p:cNvPr>
+          <p:cNvCxnSpPr>
+            <a:cxnSpLocks/>
+          </p:cNvCxnSpPr>
+          <p:nvPr/>
+        </p:nvCxnSpPr>
+        <p:spPr>
+          <a:xfrm flipV="1">
+            <a:off x="11248920" y="2170059"/>
+            <a:ext cx="1" cy="398369"/>
+          </a:xfrm>
+          <a:prstGeom prst="line">
+            <a:avLst/>
+          </a:prstGeom>
+        </p:spPr>
+        <p:style>
+          <a:lnRef idx="2">
+            <a:schemeClr val="dk1"/>
+          </a:lnRef>
+          <a:fillRef idx="0">
+            <a:schemeClr val="dk1"/>
+          </a:fillRef>
+          <a:effectRef idx="1">
+            <a:schemeClr val="dk1"/>
+          </a:effectRef>
+          <a:fontRef idx="minor">
+            <a:schemeClr val="tx1"/>
+          </a:fontRef>
+        </p:style>
+      </p:cxnSp>
+      <p:cxnSp>
+        <p:nvCxnSpPr>
+          <p:cNvPr id="63" name="Straight Connector 62">
+            <a:extLst>
+              <a:ext uri="{FF2B5EF4-FFF2-40B4-BE49-F238E27FC236}">
+                <a16:creationId xmlns:a16="http://schemas.microsoft.com/office/drawing/2014/main" id="{B43DF8A5-53C0-48F6-A2C6-90FF4E31F78A}"/>
+              </a:ext>
+            </a:extLst>
+          </p:cNvPr>
+          <p:cNvCxnSpPr>
+            <a:cxnSpLocks/>
+          </p:cNvCxnSpPr>
+          <p:nvPr/>
+        </p:nvCxnSpPr>
+        <p:spPr>
+          <a:xfrm flipV="1">
+            <a:off x="9889921" y="2157369"/>
+            <a:ext cx="0" cy="411060"/>
+          </a:xfrm>
+          <a:prstGeom prst="line">
+            <a:avLst/>
+          </a:prstGeom>
+        </p:spPr>
+        <p:style>
+          <a:lnRef idx="2">
+            <a:schemeClr val="dk1"/>
+          </a:lnRef>
+          <a:fillRef idx="0">
+            <a:schemeClr val="dk1"/>
+          </a:fillRef>
+          <a:effectRef idx="1">
+            <a:schemeClr val="dk1"/>
+          </a:effectRef>
+          <a:fontRef idx="minor">
+            <a:schemeClr val="tx1"/>
+          </a:fontRef>
+        </p:style>
+      </p:cxnSp>
+      <p:sp>
+        <p:nvSpPr>
+          <p:cNvPr id="64" name="TextBox 63">
+            <a:extLst>
+              <a:ext uri="{FF2B5EF4-FFF2-40B4-BE49-F238E27FC236}">
+                <a16:creationId xmlns:a16="http://schemas.microsoft.com/office/drawing/2014/main" id="{5560A46E-6FFD-4BC9-90C5-C0BF27E82EF9}"/>
+              </a:ext>
+            </a:extLst>
+          </p:cNvPr>
+          <p:cNvSpPr txBox="1"/>
+          <p:nvPr/>
+        </p:nvSpPr>
+        <p:spPr>
+          <a:xfrm>
+            <a:off x="9889921" y="2170059"/>
+            <a:ext cx="1359000" cy="369332"/>
+          </a:xfrm>
+          <a:prstGeom prst="rect">
+            <a:avLst/>
+          </a:prstGeom>
+          <a:noFill/>
+        </p:spPr>
+        <p:txBody>
+          <a:bodyPr wrap="square" rtlCol="0">
+            <a:spAutoFit/>
+          </a:bodyPr>
+          <a:lstStyle/>
+          <a:p>
+            <a:pPr algn="ctr"/>
+            <a:r>
+              <a:rPr lang="en-US" dirty="0"/>
+              <a:t>Road Test</a:t>
+            </a:r>
+          </a:p>
+        </p:txBody>
+      </p:sp>
+      <p:cxnSp>
+        <p:nvCxnSpPr>
+          <p:cNvPr id="65" name="Straight Connector 64">
+            <a:extLst>
+              <a:ext uri="{FF2B5EF4-FFF2-40B4-BE49-F238E27FC236}">
+                <a16:creationId xmlns:a16="http://schemas.microsoft.com/office/drawing/2014/main" id="{E8AB7332-F3F9-43A3-A141-69423ADA064E}"/>
+              </a:ext>
+            </a:extLst>
+          </p:cNvPr>
+          <p:cNvCxnSpPr>
+            <a:cxnSpLocks/>
+          </p:cNvCxnSpPr>
+          <p:nvPr/>
+        </p:nvCxnSpPr>
+        <p:spPr>
+          <a:xfrm flipH="1">
+            <a:off x="8564449" y="3710300"/>
+            <a:ext cx="1057013" cy="0"/>
+          </a:xfrm>
+          <a:prstGeom prst="line">
+            <a:avLst/>
+          </a:prstGeom>
+        </p:spPr>
+        <p:style>
+          <a:lnRef idx="2">
+            <a:schemeClr val="dk1"/>
+          </a:lnRef>
+          <a:fillRef idx="0">
+            <a:schemeClr val="dk1"/>
+          </a:fillRef>
+          <a:effectRef idx="1">
+            <a:schemeClr val="dk1"/>
+          </a:effectRef>
+          <a:fontRef idx="minor">
+            <a:schemeClr val="tx1"/>
+          </a:fontRef>
+        </p:style>
+      </p:cxnSp>
+      <p:cxnSp>
+        <p:nvCxnSpPr>
+          <p:cNvPr id="66" name="Straight Connector 65">
+            <a:extLst>
+              <a:ext uri="{FF2B5EF4-FFF2-40B4-BE49-F238E27FC236}">
+                <a16:creationId xmlns:a16="http://schemas.microsoft.com/office/drawing/2014/main" id="{8D987FB7-703C-4410-9263-00B0A4749766}"/>
+              </a:ext>
+            </a:extLst>
+          </p:cNvPr>
+          <p:cNvCxnSpPr>
+            <a:cxnSpLocks/>
+          </p:cNvCxnSpPr>
+          <p:nvPr/>
+        </p:nvCxnSpPr>
+        <p:spPr>
+          <a:xfrm flipV="1">
+            <a:off x="9621462" y="3710300"/>
+            <a:ext cx="0" cy="411060"/>
+          </a:xfrm>
+          <a:prstGeom prst="line">
+            <a:avLst/>
+          </a:prstGeom>
+        </p:spPr>
+        <p:style>
+          <a:lnRef idx="2">
+            <a:schemeClr val="dk1"/>
+          </a:lnRef>
+          <a:fillRef idx="0">
+            <a:schemeClr val="dk1"/>
+          </a:fillRef>
+          <a:effectRef idx="1">
+            <a:schemeClr val="dk1"/>
+          </a:effectRef>
+          <a:fontRef idx="minor">
+            <a:schemeClr val="tx1"/>
+          </a:fontRef>
+        </p:style>
+      </p:cxnSp>
+      <p:cxnSp>
+        <p:nvCxnSpPr>
+          <p:cNvPr id="67" name="Straight Connector 66">
+            <a:extLst>
+              <a:ext uri="{FF2B5EF4-FFF2-40B4-BE49-F238E27FC236}">
+                <a16:creationId xmlns:a16="http://schemas.microsoft.com/office/drawing/2014/main" id="{DF353F4E-3DD8-477D-BA48-37C3410B8C11}"/>
+              </a:ext>
+            </a:extLst>
+          </p:cNvPr>
+          <p:cNvCxnSpPr>
+            <a:cxnSpLocks/>
+          </p:cNvCxnSpPr>
+          <p:nvPr/>
+        </p:nvCxnSpPr>
+        <p:spPr>
+          <a:xfrm flipV="1">
+            <a:off x="8564449" y="3710300"/>
+            <a:ext cx="0" cy="411060"/>
+          </a:xfrm>
+          <a:prstGeom prst="line">
+            <a:avLst/>
+          </a:prstGeom>
+        </p:spPr>
+        <p:style>
+          <a:lnRef idx="2">
+            <a:schemeClr val="dk1"/>
+          </a:lnRef>
+          <a:fillRef idx="0">
+            <a:schemeClr val="dk1"/>
+          </a:fillRef>
+          <a:effectRef idx="1">
+            <a:schemeClr val="dk1"/>
+          </a:effectRef>
+          <a:fontRef idx="minor">
+            <a:schemeClr val="tx1"/>
+          </a:fontRef>
+        </p:style>
+      </p:cxnSp>
+      <p:sp>
+        <p:nvSpPr>
+          <p:cNvPr id="68" name="TextBox 67">
+            <a:extLst>
+              <a:ext uri="{FF2B5EF4-FFF2-40B4-BE49-F238E27FC236}">
+                <a16:creationId xmlns:a16="http://schemas.microsoft.com/office/drawing/2014/main" id="{E66E5FF6-2018-4817-8069-1167E5D57693}"/>
+              </a:ext>
+            </a:extLst>
+          </p:cNvPr>
+          <p:cNvSpPr txBox="1"/>
+          <p:nvPr/>
+        </p:nvSpPr>
+        <p:spPr>
+          <a:xfrm>
+            <a:off x="8564449" y="3722990"/>
+            <a:ext cx="1031131" cy="369332"/>
+          </a:xfrm>
+          <a:prstGeom prst="rect">
+            <a:avLst/>
+          </a:prstGeom>
+          <a:noFill/>
+        </p:spPr>
+        <p:txBody>
+          <a:bodyPr wrap="square" rtlCol="0">
+            <a:spAutoFit/>
+          </a:bodyPr>
+          <a:lstStyle/>
+          <a:p>
+            <a:pPr algn="ctr"/>
+            <a:r>
+              <a:rPr lang="en-US" dirty="0"/>
+              <a:t>Photo</a:t>
+            </a:r>
+          </a:p>
+        </p:txBody>
+      </p:sp>
+      <p:cxnSp>
+        <p:nvCxnSpPr>
+          <p:cNvPr id="73" name="Straight Connector 72">
+            <a:extLst>
+              <a:ext uri="{FF2B5EF4-FFF2-40B4-BE49-F238E27FC236}">
+                <a16:creationId xmlns:a16="http://schemas.microsoft.com/office/drawing/2014/main" id="{CFC32F1F-DE00-4852-9E7E-F3FAE2D2210E}"/>
+              </a:ext>
+            </a:extLst>
+          </p:cNvPr>
+          <p:cNvCxnSpPr>
+            <a:cxnSpLocks/>
+          </p:cNvCxnSpPr>
+          <p:nvPr/>
+        </p:nvCxnSpPr>
+        <p:spPr>
+          <a:xfrm flipH="1">
+            <a:off x="2418057" y="2822033"/>
+            <a:ext cx="1359000" cy="0"/>
+          </a:xfrm>
+          <a:prstGeom prst="line">
+            <a:avLst/>
+          </a:prstGeom>
+        </p:spPr>
+        <p:style>
+          <a:lnRef idx="2">
+            <a:schemeClr val="dk1"/>
+          </a:lnRef>
+          <a:fillRef idx="0">
+            <a:schemeClr val="dk1"/>
+          </a:fillRef>
+          <a:effectRef idx="1">
+            <a:schemeClr val="dk1"/>
+          </a:effectRef>
+          <a:fontRef idx="minor">
+            <a:schemeClr val="tx1"/>
+          </a:fontRef>
+        </p:style>
+      </p:cxnSp>
+      <p:cxnSp>
+        <p:nvCxnSpPr>
+          <p:cNvPr id="74" name="Straight Connector 73">
+            <a:extLst>
+              <a:ext uri="{FF2B5EF4-FFF2-40B4-BE49-F238E27FC236}">
+                <a16:creationId xmlns:a16="http://schemas.microsoft.com/office/drawing/2014/main" id="{6C9E2E71-0717-4FE5-A773-90768841EE8A}"/>
+              </a:ext>
+            </a:extLst>
+          </p:cNvPr>
+          <p:cNvCxnSpPr>
+            <a:cxnSpLocks/>
+          </p:cNvCxnSpPr>
+          <p:nvPr/>
+        </p:nvCxnSpPr>
+        <p:spPr>
+          <a:xfrm flipV="1">
+            <a:off x="3777056" y="2834723"/>
+            <a:ext cx="1" cy="398369"/>
+          </a:xfrm>
+          <a:prstGeom prst="line">
+            <a:avLst/>
+          </a:prstGeom>
+        </p:spPr>
+        <p:style>
+          <a:lnRef idx="2">
+            <a:schemeClr val="dk1"/>
+          </a:lnRef>
+          <a:fillRef idx="0">
+            <a:schemeClr val="dk1"/>
+          </a:fillRef>
+          <a:effectRef idx="1">
+            <a:schemeClr val="dk1"/>
+          </a:effectRef>
+          <a:fontRef idx="minor">
+            <a:schemeClr val="tx1"/>
+          </a:fontRef>
+        </p:style>
+      </p:cxnSp>
+      <p:cxnSp>
+        <p:nvCxnSpPr>
+          <p:cNvPr id="75" name="Straight Connector 74">
+            <a:extLst>
+              <a:ext uri="{FF2B5EF4-FFF2-40B4-BE49-F238E27FC236}">
+                <a16:creationId xmlns:a16="http://schemas.microsoft.com/office/drawing/2014/main" id="{B8A7B44E-AF86-4174-98EA-C5A5EF02F0F6}"/>
+              </a:ext>
+            </a:extLst>
+          </p:cNvPr>
+          <p:cNvCxnSpPr>
+            <a:cxnSpLocks/>
+          </p:cNvCxnSpPr>
+          <p:nvPr/>
+        </p:nvCxnSpPr>
+        <p:spPr>
+          <a:xfrm flipV="1">
+            <a:off x="2418057" y="2822033"/>
+            <a:ext cx="0" cy="411060"/>
+          </a:xfrm>
+          <a:prstGeom prst="line">
+            <a:avLst/>
+          </a:prstGeom>
+        </p:spPr>
+        <p:style>
+          <a:lnRef idx="2">
+            <a:schemeClr val="dk1"/>
+          </a:lnRef>
+          <a:fillRef idx="0">
+            <a:schemeClr val="dk1"/>
+          </a:fillRef>
+          <a:effectRef idx="1">
+            <a:schemeClr val="dk1"/>
+          </a:effectRef>
+          <a:fontRef idx="minor">
+            <a:schemeClr val="tx1"/>
+          </a:fontRef>
+        </p:style>
+      </p:cxnSp>
+      <p:sp>
+        <p:nvSpPr>
+          <p:cNvPr id="76" name="TextBox 75">
+            <a:extLst>
+              <a:ext uri="{FF2B5EF4-FFF2-40B4-BE49-F238E27FC236}">
+                <a16:creationId xmlns:a16="http://schemas.microsoft.com/office/drawing/2014/main" id="{61638FC3-E223-4D67-876F-C8593A56FBAB}"/>
+              </a:ext>
+            </a:extLst>
+          </p:cNvPr>
+          <p:cNvSpPr txBox="1"/>
+          <p:nvPr/>
+        </p:nvSpPr>
+        <p:spPr>
+          <a:xfrm>
+            <a:off x="2418057" y="2834723"/>
+            <a:ext cx="1359000" cy="369332"/>
+          </a:xfrm>
+          <a:prstGeom prst="rect">
+            <a:avLst/>
+          </a:prstGeom>
+          <a:noFill/>
+        </p:spPr>
+        <p:txBody>
+          <a:bodyPr wrap="square" rtlCol="0">
+            <a:spAutoFit/>
+          </a:bodyPr>
+          <a:lstStyle/>
+          <a:p>
+            <a:pPr algn="ctr"/>
+            <a:r>
+              <a:rPr lang="en-US" dirty="0"/>
+              <a:t>Written Test</a:t>
+            </a:r>
+          </a:p>
+        </p:txBody>
+      </p:sp>
+      <p:cxnSp>
+        <p:nvCxnSpPr>
+          <p:cNvPr id="77" name="Straight Arrow Connector 76">
+            <a:extLst>
+              <a:ext uri="{FF2B5EF4-FFF2-40B4-BE49-F238E27FC236}">
+                <a16:creationId xmlns:a16="http://schemas.microsoft.com/office/drawing/2014/main" id="{96555CAA-F8C6-4B9F-966C-66F2D8DB26D6}"/>
+              </a:ext>
+            </a:extLst>
+          </p:cNvPr>
+          <p:cNvCxnSpPr>
+            <a:cxnSpLocks/>
+          </p:cNvCxnSpPr>
+          <p:nvPr/>
+        </p:nvCxnSpPr>
+        <p:spPr>
+          <a:xfrm flipH="1">
+            <a:off x="3636630" y="1142024"/>
+            <a:ext cx="1123240" cy="1385134"/>
+          </a:xfrm>
+          <a:prstGeom prst="straightConnector1">
+            <a:avLst/>
+          </a:prstGeom>
+          <a:ln>
+            <a:tailEnd type="triangle"/>
+          </a:ln>
+        </p:spPr>
+        <p:style>
+          <a:lnRef idx="1">
+            <a:schemeClr val="dk1"/>
+          </a:lnRef>
+          <a:fillRef idx="0">
+            <a:schemeClr val="dk1"/>
+          </a:fillRef>
+          <a:effectRef idx="0">
+            <a:schemeClr val="dk1"/>
+          </a:effectRef>
+          <a:fontRef idx="minor">
+            <a:schemeClr val="tx1"/>
+          </a:fontRef>
+        </p:style>
+      </p:cxnSp>
+      <p:cxnSp>
+        <p:nvCxnSpPr>
+          <p:cNvPr id="79" name="Straight Arrow Connector 78">
+            <a:extLst>
+              <a:ext uri="{FF2B5EF4-FFF2-40B4-BE49-F238E27FC236}">
+                <a16:creationId xmlns:a16="http://schemas.microsoft.com/office/drawing/2014/main" id="{5673AF89-0723-4831-8886-ABA40631F665}"/>
+              </a:ext>
+            </a:extLst>
+          </p:cNvPr>
+          <p:cNvCxnSpPr>
+            <a:cxnSpLocks/>
+          </p:cNvCxnSpPr>
+          <p:nvPr/>
+        </p:nvCxnSpPr>
+        <p:spPr>
+          <a:xfrm>
+            <a:off x="3007277" y="3393558"/>
+            <a:ext cx="4100993" cy="3114094"/>
+          </a:xfrm>
+          <a:prstGeom prst="straightConnector1">
+            <a:avLst/>
+          </a:prstGeom>
+          <a:ln>
+            <a:tailEnd type="triangle"/>
+          </a:ln>
+        </p:spPr>
+        <p:style>
+          <a:lnRef idx="1">
+            <a:schemeClr val="dk1"/>
+          </a:lnRef>
+          <a:fillRef idx="0">
+            <a:schemeClr val="dk1"/>
+          </a:fillRef>
+          <a:effectRef idx="0">
+            <a:schemeClr val="dk1"/>
+          </a:effectRef>
+          <a:fontRef idx="minor">
+            <a:schemeClr val="tx1"/>
+          </a:fontRef>
+        </p:style>
+      </p:cxnSp>
+      <p:cxnSp>
+        <p:nvCxnSpPr>
+          <p:cNvPr id="85" name="Straight Arrow Connector 84">
+            <a:extLst>
+              <a:ext uri="{FF2B5EF4-FFF2-40B4-BE49-F238E27FC236}">
+                <a16:creationId xmlns:a16="http://schemas.microsoft.com/office/drawing/2014/main" id="{8873FBA5-083F-489B-81AD-B0DE08860756}"/>
+              </a:ext>
+            </a:extLst>
+          </p:cNvPr>
+          <p:cNvCxnSpPr>
+            <a:cxnSpLocks/>
+          </p:cNvCxnSpPr>
+          <p:nvPr/>
+        </p:nvCxnSpPr>
+        <p:spPr>
+          <a:xfrm flipH="1">
+            <a:off x="9806730" y="2828966"/>
+            <a:ext cx="574316" cy="744744"/>
+          </a:xfrm>
+          <a:prstGeom prst="straightConnector1">
+            <a:avLst/>
+          </a:prstGeom>
+          <a:ln>
+            <a:tailEnd type="triangle"/>
+          </a:ln>
+        </p:spPr>
+        <p:style>
+          <a:lnRef idx="1">
+            <a:schemeClr val="dk1"/>
+          </a:lnRef>
+          <a:fillRef idx="0">
+            <a:schemeClr val="dk1"/>
+          </a:fillRef>
+          <a:effectRef idx="0">
+            <a:schemeClr val="dk1"/>
+          </a:effectRef>
+          <a:fontRef idx="minor">
+            <a:schemeClr val="tx1"/>
+          </a:fontRef>
+        </p:style>
+      </p:cxnSp>
+      <p:cxnSp>
+        <p:nvCxnSpPr>
+          <p:cNvPr id="87" name="Straight Arrow Connector 86">
+            <a:extLst>
+              <a:ext uri="{FF2B5EF4-FFF2-40B4-BE49-F238E27FC236}">
+                <a16:creationId xmlns:a16="http://schemas.microsoft.com/office/drawing/2014/main" id="{1CEB5CDB-8B25-4738-BD92-502A8510E13B}"/>
+              </a:ext>
+            </a:extLst>
+          </p:cNvPr>
+          <p:cNvCxnSpPr>
+            <a:cxnSpLocks/>
+          </p:cNvCxnSpPr>
+          <p:nvPr/>
+        </p:nvCxnSpPr>
+        <p:spPr>
+          <a:xfrm flipH="1">
+            <a:off x="7497626" y="4092322"/>
+            <a:ext cx="730940" cy="229513"/>
+          </a:xfrm>
+          <a:prstGeom prst="straightConnector1">
+            <a:avLst/>
+          </a:prstGeom>
+          <a:ln>
+            <a:tailEnd type="triangle"/>
+          </a:ln>
+        </p:spPr>
+        <p:style>
+          <a:lnRef idx="1">
+            <a:schemeClr val="dk1"/>
+          </a:lnRef>
+          <a:fillRef idx="0">
+            <a:schemeClr val="dk1"/>
+          </a:fillRef>
+          <a:effectRef idx="0">
+            <a:schemeClr val="dk1"/>
+          </a:effectRef>
+          <a:fontRef idx="minor">
+            <a:schemeClr val="tx1"/>
+          </a:fontRef>
+        </p:style>
+      </p:cxnSp>
+      <p:cxnSp>
+        <p:nvCxnSpPr>
+          <p:cNvPr id="89" name="Straight Arrow Connector 88">
+            <a:extLst>
+              <a:ext uri="{FF2B5EF4-FFF2-40B4-BE49-F238E27FC236}">
+                <a16:creationId xmlns:a16="http://schemas.microsoft.com/office/drawing/2014/main" id="{998E0A51-8981-4355-9F16-23504B00CDAB}"/>
+              </a:ext>
+            </a:extLst>
+          </p:cNvPr>
+          <p:cNvCxnSpPr>
+            <a:cxnSpLocks/>
+          </p:cNvCxnSpPr>
+          <p:nvPr/>
+        </p:nvCxnSpPr>
+        <p:spPr>
+          <a:xfrm>
+            <a:off x="6319042" y="777380"/>
+            <a:ext cx="3487688" cy="1487648"/>
+          </a:xfrm>
+          <a:prstGeom prst="straightConnector1">
+            <a:avLst/>
+          </a:prstGeom>
+          <a:ln>
+            <a:tailEnd type="triangle"/>
+          </a:ln>
+        </p:spPr>
+        <p:style>
+          <a:lnRef idx="1">
+            <a:schemeClr val="dk1"/>
+          </a:lnRef>
+          <a:fillRef idx="0">
+            <a:schemeClr val="dk1"/>
+          </a:fillRef>
+          <a:effectRef idx="0">
+            <a:schemeClr val="dk1"/>
+          </a:effectRef>
+          <a:fontRef idx="minor">
+            <a:schemeClr val="tx1"/>
+          </a:fontRef>
+        </p:style>
+      </p:cxnSp>
+      <p:cxnSp>
+        <p:nvCxnSpPr>
+          <p:cNvPr id="91" name="Straight Arrow Connector 90">
+            <a:extLst>
+              <a:ext uri="{FF2B5EF4-FFF2-40B4-BE49-F238E27FC236}">
+                <a16:creationId xmlns:a16="http://schemas.microsoft.com/office/drawing/2014/main" id="{09F4F7D2-9A7D-4277-81C2-0D881F417468}"/>
+              </a:ext>
+            </a:extLst>
+          </p:cNvPr>
+          <p:cNvCxnSpPr>
+            <a:cxnSpLocks/>
+          </p:cNvCxnSpPr>
+          <p:nvPr/>
+        </p:nvCxnSpPr>
+        <p:spPr>
+          <a:xfrm>
+            <a:off x="6319042" y="777380"/>
+            <a:ext cx="1977670" cy="2796330"/>
+          </a:xfrm>
+          <a:prstGeom prst="straightConnector1">
+            <a:avLst/>
+          </a:prstGeom>
+          <a:ln>
+            <a:tailEnd type="triangle"/>
+          </a:ln>
+        </p:spPr>
+        <p:style>
+          <a:lnRef idx="1">
+            <a:schemeClr val="dk1"/>
+          </a:lnRef>
+          <a:fillRef idx="0">
+            <a:schemeClr val="dk1"/>
+          </a:fillRef>
+          <a:effectRef idx="0">
+            <a:schemeClr val="dk1"/>
+          </a:effectRef>
+          <a:fontRef idx="minor">
+            <a:schemeClr val="tx1"/>
+          </a:fontRef>
+        </p:style>
+      </p:cxnSp>
+      <p:cxnSp>
+        <p:nvCxnSpPr>
+          <p:cNvPr id="95" name="Straight Arrow Connector 94">
+            <a:extLst>
+              <a:ext uri="{FF2B5EF4-FFF2-40B4-BE49-F238E27FC236}">
+                <a16:creationId xmlns:a16="http://schemas.microsoft.com/office/drawing/2014/main" id="{6B8A959D-70AB-49C5-AA36-614904FB16D3}"/>
+              </a:ext>
+            </a:extLst>
+          </p:cNvPr>
+          <p:cNvCxnSpPr>
+            <a:cxnSpLocks/>
+          </p:cNvCxnSpPr>
+          <p:nvPr/>
+        </p:nvCxnSpPr>
+        <p:spPr>
+          <a:xfrm flipH="1">
+            <a:off x="8853829" y="2689743"/>
+            <a:ext cx="1734510" cy="3620554"/>
+          </a:xfrm>
+          <a:prstGeom prst="straightConnector1">
+            <a:avLst/>
+          </a:prstGeom>
+          <a:ln>
+            <a:tailEnd type="triangle"/>
+          </a:ln>
+        </p:spPr>
+        <p:style>
+          <a:lnRef idx="1">
+            <a:schemeClr val="dk1"/>
+          </a:lnRef>
+          <a:fillRef idx="0">
+            <a:schemeClr val="dk1"/>
+          </a:fillRef>
+          <a:effectRef idx="0">
+            <a:schemeClr val="dk1"/>
+          </a:effectRef>
+          <a:fontRef idx="minor">
+            <a:schemeClr val="tx1"/>
+          </a:fontRef>
+        </p:style>
+      </p:cxnSp>
+      <p:cxnSp>
+        <p:nvCxnSpPr>
+          <p:cNvPr id="99" name="Straight Arrow Connector 98">
+            <a:extLst>
+              <a:ext uri="{FF2B5EF4-FFF2-40B4-BE49-F238E27FC236}">
+                <a16:creationId xmlns:a16="http://schemas.microsoft.com/office/drawing/2014/main" id="{A8437C9D-E39F-48F9-9638-9C1E259357B0}"/>
+              </a:ext>
+            </a:extLst>
+          </p:cNvPr>
+          <p:cNvCxnSpPr>
+            <a:cxnSpLocks/>
+          </p:cNvCxnSpPr>
+          <p:nvPr/>
+        </p:nvCxnSpPr>
+        <p:spPr>
+          <a:xfrm flipH="1">
+            <a:off x="4705338" y="1053400"/>
+            <a:ext cx="614584" cy="5638918"/>
+          </a:xfrm>
+          <a:prstGeom prst="straightConnector1">
+            <a:avLst/>
+          </a:prstGeom>
+          <a:ln>
+            <a:tailEnd type="triangle"/>
+          </a:ln>
+        </p:spPr>
+        <p:style>
+          <a:lnRef idx="1">
+            <a:schemeClr val="dk1"/>
+          </a:lnRef>
+          <a:fillRef idx="0">
+            <a:schemeClr val="dk1"/>
+          </a:fillRef>
+          <a:effectRef idx="0">
+            <a:schemeClr val="dk1"/>
+          </a:effectRef>
+          <a:fontRef idx="minor">
+            <a:schemeClr val="tx1"/>
+          </a:fontRef>
+        </p:style>
+      </p:cxnSp>
+      <p:cxnSp>
+        <p:nvCxnSpPr>
+          <p:cNvPr id="106" name="Straight Arrow Connector 105">
+            <a:extLst>
+              <a:ext uri="{FF2B5EF4-FFF2-40B4-BE49-F238E27FC236}">
+                <a16:creationId xmlns:a16="http://schemas.microsoft.com/office/drawing/2014/main" id="{C17FD032-E242-45B6-889D-46C2A7A77051}"/>
+              </a:ext>
+            </a:extLst>
+          </p:cNvPr>
+          <p:cNvCxnSpPr>
+            <a:cxnSpLocks/>
+          </p:cNvCxnSpPr>
+          <p:nvPr/>
+        </p:nvCxnSpPr>
+        <p:spPr>
+          <a:xfrm flipH="1">
+            <a:off x="6383637" y="5204214"/>
+            <a:ext cx="189488" cy="1343603"/>
+          </a:xfrm>
+          <a:prstGeom prst="straightConnector1">
+            <a:avLst/>
+          </a:prstGeom>
+          <a:ln>
+            <a:tailEnd type="triangle"/>
+          </a:ln>
+        </p:spPr>
+        <p:style>
+          <a:lnRef idx="1">
+            <a:schemeClr val="dk1"/>
+          </a:lnRef>
+          <a:fillRef idx="0">
+            <a:schemeClr val="dk1"/>
+          </a:fillRef>
+          <a:effectRef idx="0">
+            <a:schemeClr val="dk1"/>
+          </a:effectRef>
+          <a:fontRef idx="minor">
+            <a:schemeClr val="tx1"/>
+          </a:fontRef>
+        </p:style>
+      </p:cxnSp>
     </p:spTree>
     <p:extLst>
       <p:ext uri="{BB962C8B-B14F-4D97-AF65-F5344CB8AC3E}">
@@ -4499,8 +5134,8 @@
           </a:fontRef>
         </p:style>
       </p:cxnSp>
-      <mc:AlternateContent xmlns:mc="http://schemas.openxmlformats.org/markup-compatibility/2006">
-        <mc:Choice xmlns:a14="http://schemas.microsoft.com/office/drawing/2010/main" Requires="a14">
+      <mc:AlternateContent xmlns:mc="http://schemas.openxmlformats.org/markup-compatibility/2006" xmlns:a14="http://schemas.microsoft.com/office/drawing/2010/main">
+        <mc:Choice Requires="a14">
           <p:sp>
             <p:nvSpPr>
               <p:cNvPr id="40" name="TextBox 39">
@@ -4555,7 +5190,7 @@
             </p:txBody>
           </p:sp>
         </mc:Choice>
-        <mc:Fallback>
+        <mc:Fallback xmlns="">
           <p:sp>
             <p:nvSpPr>
               <p:cNvPr id="40" name="TextBox 39">
@@ -4646,8 +5281,8 @@
           </a:fontRef>
         </p:style>
       </p:cxnSp>
-      <mc:AlternateContent xmlns:mc="http://schemas.openxmlformats.org/markup-compatibility/2006">
-        <mc:Choice xmlns:a14="http://schemas.microsoft.com/office/drawing/2010/main" Requires="a14">
+      <mc:AlternateContent xmlns:mc="http://schemas.openxmlformats.org/markup-compatibility/2006" xmlns:a14="http://schemas.microsoft.com/office/drawing/2010/main">
+        <mc:Choice Requires="a14">
           <p:sp>
             <p:nvSpPr>
               <p:cNvPr id="27" name="TextBox 26">
@@ -4721,7 +5356,7 @@
             </p:txBody>
           </p:sp>
         </mc:Choice>
-        <mc:Fallback>
+        <mc:Fallback xmlns="">
           <p:sp>
             <p:nvSpPr>
               <p:cNvPr id="27" name="TextBox 26">
@@ -4812,8 +5447,8 @@
           </a:fontRef>
         </p:style>
       </p:cxnSp>
-      <mc:AlternateContent xmlns:mc="http://schemas.openxmlformats.org/markup-compatibility/2006">
-        <mc:Choice xmlns:a14="http://schemas.microsoft.com/office/drawing/2010/main" Requires="a14">
+      <mc:AlternateContent xmlns:mc="http://schemas.openxmlformats.org/markup-compatibility/2006" xmlns:a14="http://schemas.microsoft.com/office/drawing/2010/main">
+        <mc:Choice Requires="a14">
           <p:sp>
             <p:nvSpPr>
               <p:cNvPr id="30" name="TextBox 29">
@@ -4868,7 +5503,7 @@
             </p:txBody>
           </p:sp>
         </mc:Choice>
-        <mc:Fallback>
+        <mc:Fallback xmlns="">
           <p:sp>
             <p:nvSpPr>
               <p:cNvPr id="30" name="TextBox 29">
@@ -4959,8 +5594,8 @@
           </a:fontRef>
         </p:style>
       </p:cxnSp>
-      <mc:AlternateContent xmlns:mc="http://schemas.openxmlformats.org/markup-compatibility/2006">
-        <mc:Choice xmlns:a14="http://schemas.microsoft.com/office/drawing/2010/main" Requires="a14">
+      <mc:AlternateContent xmlns:mc="http://schemas.openxmlformats.org/markup-compatibility/2006" xmlns:a14="http://schemas.microsoft.com/office/drawing/2010/main">
+        <mc:Choice Requires="a14">
           <p:sp>
             <p:nvSpPr>
               <p:cNvPr id="34" name="TextBox 33">
@@ -5027,7 +5662,7 @@
             </p:txBody>
           </p:sp>
         </mc:Choice>
-        <mc:Fallback>
+        <mc:Fallback xmlns="">
           <p:sp>
             <p:nvSpPr>
               <p:cNvPr id="34" name="TextBox 33">
@@ -5303,6 +5938,877 @@
     <p:extLst>
       <p:ext uri="{BB962C8B-B14F-4D97-AF65-F5344CB8AC3E}">
         <p14:creationId xmlns:p14="http://schemas.microsoft.com/office/powerpoint/2010/main" val="628964198"/>
+      </p:ext>
+    </p:extLst>
+  </p:cSld>
+  <p:clrMapOvr>
+    <a:masterClrMapping/>
+  </p:clrMapOvr>
+</p:sld>
+</file>
+
+<file path=ppt/slides/slide3.xml><?xml version="1.0" encoding="utf-8"?>
+<p:sld xmlns:a="http://schemas.openxmlformats.org/drawingml/2006/main" xmlns:r="http://schemas.openxmlformats.org/officeDocument/2006/relationships" xmlns:p="http://schemas.openxmlformats.org/presentationml/2006/main">
+  <p:cSld>
+    <p:spTree>
+      <p:nvGrpSpPr>
+        <p:cNvPr id="1" name=""/>
+        <p:cNvGrpSpPr/>
+        <p:nvPr/>
+      </p:nvGrpSpPr>
+      <p:grpSpPr>
+        <a:xfrm>
+          <a:off x="0" y="0"/>
+          <a:ext cx="0" cy="0"/>
+          <a:chOff x="0" y="0"/>
+          <a:chExt cx="0" cy="0"/>
+        </a:xfrm>
+      </p:grpSpPr>
+      <p:cxnSp>
+        <p:nvCxnSpPr>
+          <p:cNvPr id="28" name="Straight Arrow Connector 27">
+            <a:extLst>
+              <a:ext uri="{FF2B5EF4-FFF2-40B4-BE49-F238E27FC236}">
+                <a16:creationId xmlns:a16="http://schemas.microsoft.com/office/drawing/2014/main" id="{57D7A336-8854-4EB0-BF58-207EB14F2226}"/>
+              </a:ext>
+            </a:extLst>
+          </p:cNvPr>
+          <p:cNvCxnSpPr>
+            <a:cxnSpLocks/>
+          </p:cNvCxnSpPr>
+          <p:nvPr/>
+        </p:nvCxnSpPr>
+        <p:spPr>
+          <a:xfrm>
+            <a:off x="1586204" y="1904642"/>
+            <a:ext cx="937470" cy="0"/>
+          </a:xfrm>
+          <a:prstGeom prst="straightConnector1">
+            <a:avLst/>
+          </a:prstGeom>
+          <a:ln>
+            <a:tailEnd type="triangle"/>
+          </a:ln>
+        </p:spPr>
+        <p:style>
+          <a:lnRef idx="1">
+            <a:schemeClr val="dk1"/>
+          </a:lnRef>
+          <a:fillRef idx="0">
+            <a:schemeClr val="dk1"/>
+          </a:fillRef>
+          <a:effectRef idx="0">
+            <a:schemeClr val="dk1"/>
+          </a:effectRef>
+          <a:fontRef idx="minor">
+            <a:schemeClr val="tx1"/>
+          </a:fontRef>
+        </p:style>
+      </p:cxnSp>
+      <mc:AlternateContent xmlns:mc="http://schemas.openxmlformats.org/markup-compatibility/2006" xmlns:a14="http://schemas.microsoft.com/office/drawing/2010/main">
+        <mc:Choice Requires="a14">
+          <p:sp>
+            <p:nvSpPr>
+              <p:cNvPr id="40" name="TextBox 39">
+                <a:extLst>
+                  <a:ext uri="{FF2B5EF4-FFF2-40B4-BE49-F238E27FC236}">
+                    <a16:creationId xmlns:a16="http://schemas.microsoft.com/office/drawing/2014/main" id="{1F7C8746-AFF6-465F-8628-7468A202D2DF}"/>
+                  </a:ext>
+                </a:extLst>
+              </p:cNvPr>
+              <p:cNvSpPr txBox="1"/>
+              <p:nvPr/>
+            </p:nvSpPr>
+            <p:spPr>
+              <a:xfrm>
+                <a:off x="1013272" y="1644966"/>
+                <a:ext cx="638246" cy="519351"/>
+              </a:xfrm>
+              <a:prstGeom prst="ellipse">
+                <a:avLst/>
+              </a:prstGeom>
+              <a:noFill/>
+              <a:ln w="15875">
+                <a:solidFill>
+                  <a:schemeClr val="tx1"/>
+                </a:solidFill>
+              </a:ln>
+            </p:spPr>
+            <p:txBody>
+              <a:bodyPr wrap="square" rtlCol="0">
+                <a:spAutoFit/>
+              </a:bodyPr>
+              <a:lstStyle/>
+              <a:p>
+                <a:pPr/>
+                <a14:m>
+                  <m:oMathPara xmlns:m="http://schemas.openxmlformats.org/officeDocument/2006/math">
+                    <m:oMathParaPr>
+                      <m:jc m:val="centerGroup"/>
+                    </m:oMathParaPr>
+                    <m:oMath xmlns:m="http://schemas.openxmlformats.org/officeDocument/2006/math">
+                      <m:r>
+                        <a:rPr lang="en-US" b="0" i="1" smtClean="0">
+                          <a:latin typeface="Cambria Math" panose="02040503050406030204" pitchFamily="18" charset="0"/>
+                        </a:rPr>
+                        <m:t>𝐼</m:t>
+                      </m:r>
+                    </m:oMath>
+                  </m:oMathPara>
+                </a14:m>
+                <a:endParaRPr lang="en-US" dirty="0"/>
+              </a:p>
+            </p:txBody>
+          </p:sp>
+        </mc:Choice>
+        <mc:Fallback xmlns="">
+          <p:sp>
+            <p:nvSpPr>
+              <p:cNvPr id="40" name="TextBox 39">
+                <a:extLst>
+                  <a:ext uri="{FF2B5EF4-FFF2-40B4-BE49-F238E27FC236}">
+                    <a16:creationId xmlns:a16="http://schemas.microsoft.com/office/drawing/2014/main" id="{1F7C8746-AFF6-465F-8628-7468A202D2DF}"/>
+                  </a:ext>
+                </a:extLst>
+              </p:cNvPr>
+              <p:cNvSpPr txBox="1">
+                <a:spLocks noRot="1" noChangeAspect="1" noMove="1" noResize="1" noEditPoints="1" noAdjustHandles="1" noChangeArrowheads="1" noChangeShapeType="1" noTextEdit="1"/>
+              </p:cNvSpPr>
+              <p:nvPr/>
+            </p:nvSpPr>
+            <p:spPr>
+              <a:xfrm>
+                <a:off x="1013272" y="1644966"/>
+                <a:ext cx="638246" cy="519351"/>
+              </a:xfrm>
+              <a:prstGeom prst="ellipse">
+                <a:avLst/>
+              </a:prstGeom>
+              <a:blipFill>
+                <a:blip r:embed="rId2"/>
+                <a:stretch>
+                  <a:fillRect/>
+                </a:stretch>
+              </a:blipFill>
+              <a:ln w="15875">
+                <a:solidFill>
+                  <a:schemeClr val="tx1"/>
+                </a:solidFill>
+              </a:ln>
+            </p:spPr>
+            <p:txBody>
+              <a:bodyPr/>
+              <a:lstStyle/>
+              <a:p>
+                <a:r>
+                  <a:rPr lang="en-US">
+                    <a:noFill/>
+                  </a:rPr>
+                  <a:t> </a:t>
+                </a:r>
+              </a:p>
+            </p:txBody>
+          </p:sp>
+        </mc:Fallback>
+      </mc:AlternateContent>
+      <p:cxnSp>
+        <p:nvCxnSpPr>
+          <p:cNvPr id="22" name="Straight Arrow Connector 21">
+            <a:extLst>
+              <a:ext uri="{FF2B5EF4-FFF2-40B4-BE49-F238E27FC236}">
+                <a16:creationId xmlns:a16="http://schemas.microsoft.com/office/drawing/2014/main" id="{C9E16B83-0D1D-4511-9083-948114B6E176}"/>
+              </a:ext>
+            </a:extLst>
+          </p:cNvPr>
+          <p:cNvCxnSpPr>
+            <a:cxnSpLocks/>
+          </p:cNvCxnSpPr>
+          <p:nvPr/>
+        </p:nvCxnSpPr>
+        <p:spPr>
+          <a:xfrm>
+            <a:off x="7710196" y="5807948"/>
+            <a:ext cx="937470" cy="0"/>
+          </a:xfrm>
+          <a:prstGeom prst="straightConnector1">
+            <a:avLst/>
+          </a:prstGeom>
+          <a:ln>
+            <a:tailEnd type="triangle"/>
+          </a:ln>
+        </p:spPr>
+        <p:style>
+          <a:lnRef idx="1">
+            <a:schemeClr val="dk1"/>
+          </a:lnRef>
+          <a:fillRef idx="0">
+            <a:schemeClr val="dk1"/>
+          </a:fillRef>
+          <a:effectRef idx="0">
+            <a:schemeClr val="dk1"/>
+          </a:effectRef>
+          <a:fontRef idx="minor">
+            <a:schemeClr val="tx1"/>
+          </a:fontRef>
+        </p:style>
+      </p:cxnSp>
+      <mc:AlternateContent xmlns:mc="http://schemas.openxmlformats.org/markup-compatibility/2006" xmlns:a14="http://schemas.microsoft.com/office/drawing/2010/main">
+        <mc:Choice Requires="a14">
+          <p:sp>
+            <p:nvSpPr>
+              <p:cNvPr id="27" name="TextBox 26">
+                <a:extLst>
+                  <a:ext uri="{FF2B5EF4-FFF2-40B4-BE49-F238E27FC236}">
+                    <a16:creationId xmlns:a16="http://schemas.microsoft.com/office/drawing/2014/main" id="{7A3C4A05-D5B0-4B50-BC13-11FA1C2CE10E}"/>
+                  </a:ext>
+                </a:extLst>
+              </p:cNvPr>
+              <p:cNvSpPr txBox="1"/>
+              <p:nvPr/>
+            </p:nvSpPr>
+            <p:spPr>
+              <a:xfrm>
+                <a:off x="7071950" y="5541608"/>
+                <a:ext cx="638246" cy="519351"/>
+              </a:xfrm>
+              <a:prstGeom prst="ellipse">
+                <a:avLst/>
+              </a:prstGeom>
+              <a:noFill/>
+              <a:ln w="15875">
+                <a:solidFill>
+                  <a:schemeClr val="tx1"/>
+                </a:solidFill>
+              </a:ln>
+            </p:spPr>
+            <p:txBody>
+              <a:bodyPr wrap="square" rtlCol="0">
+                <a:spAutoFit/>
+              </a:bodyPr>
+              <a:lstStyle/>
+              <a:p>
+                <a:pPr/>
+                <a14:m>
+                  <m:oMathPara xmlns:m="http://schemas.openxmlformats.org/officeDocument/2006/math">
+                    <m:oMathParaPr>
+                      <m:jc m:val="centerGroup"/>
+                    </m:oMathParaPr>
+                    <m:oMath xmlns:m="http://schemas.openxmlformats.org/officeDocument/2006/math">
+                      <m:sSub>
+                        <m:sSubPr>
+                          <m:ctrlPr>
+                            <a:rPr lang="en-US" i="1" smtClean="0">
+                              <a:latin typeface="Cambria Math" panose="02040503050406030204" pitchFamily="18" charset="0"/>
+                            </a:rPr>
+                          </m:ctrlPr>
+                        </m:sSubPr>
+                        <m:e>
+                          <m:r>
+                            <a:rPr lang="en-US" b="0" i="1" smtClean="0">
+                              <a:latin typeface="Cambria Math" panose="02040503050406030204" pitchFamily="18" charset="0"/>
+                            </a:rPr>
+                            <m:t>𝑇</m:t>
+                          </m:r>
+                        </m:e>
+                        <m:sub>
+                          <m:r>
+                            <a:rPr lang="en-US" b="0" i="1" smtClean="0">
+                              <a:latin typeface="Cambria Math" panose="02040503050406030204" pitchFamily="18" charset="0"/>
+                            </a:rPr>
+                            <m:t>𝐴</m:t>
+                          </m:r>
+                        </m:sub>
+                      </m:sSub>
+                    </m:oMath>
+                  </m:oMathPara>
+                </a14:m>
+                <a:endParaRPr lang="en-US" dirty="0"/>
+              </a:p>
+            </p:txBody>
+          </p:sp>
+        </mc:Choice>
+        <mc:Fallback xmlns="">
+          <p:sp>
+            <p:nvSpPr>
+              <p:cNvPr id="27" name="TextBox 26">
+                <a:extLst>
+                  <a:ext uri="{FF2B5EF4-FFF2-40B4-BE49-F238E27FC236}">
+                    <a16:creationId xmlns:a16="http://schemas.microsoft.com/office/drawing/2014/main" id="{7A3C4A05-D5B0-4B50-BC13-11FA1C2CE10E}"/>
+                  </a:ext>
+                </a:extLst>
+              </p:cNvPr>
+              <p:cNvSpPr txBox="1">
+                <a:spLocks noRot="1" noChangeAspect="1" noMove="1" noResize="1" noEditPoints="1" noAdjustHandles="1" noChangeArrowheads="1" noChangeShapeType="1" noTextEdit="1"/>
+              </p:cNvSpPr>
+              <p:nvPr/>
+            </p:nvSpPr>
+            <p:spPr>
+              <a:xfrm>
+                <a:off x="7071950" y="5541608"/>
+                <a:ext cx="638246" cy="519351"/>
+              </a:xfrm>
+              <a:prstGeom prst="ellipse">
+                <a:avLst/>
+              </a:prstGeom>
+              <a:blipFill>
+                <a:blip r:embed="rId3"/>
+                <a:stretch>
+                  <a:fillRect/>
+                </a:stretch>
+              </a:blipFill>
+              <a:ln w="15875">
+                <a:solidFill>
+                  <a:schemeClr val="tx1"/>
+                </a:solidFill>
+              </a:ln>
+            </p:spPr>
+            <p:txBody>
+              <a:bodyPr/>
+              <a:lstStyle/>
+              <a:p>
+                <a:r>
+                  <a:rPr lang="en-US">
+                    <a:noFill/>
+                  </a:rPr>
+                  <a:t> </a:t>
+                </a:r>
+              </a:p>
+            </p:txBody>
+          </p:sp>
+        </mc:Fallback>
+      </mc:AlternateContent>
+      <p:cxnSp>
+        <p:nvCxnSpPr>
+          <p:cNvPr id="29" name="Straight Arrow Connector 28">
+            <a:extLst>
+              <a:ext uri="{FF2B5EF4-FFF2-40B4-BE49-F238E27FC236}">
+                <a16:creationId xmlns:a16="http://schemas.microsoft.com/office/drawing/2014/main" id="{9C80ABBB-8A19-43DA-BF49-2CE8AB6E37E6}"/>
+              </a:ext>
+            </a:extLst>
+          </p:cNvPr>
+          <p:cNvCxnSpPr>
+            <a:cxnSpLocks/>
+          </p:cNvCxnSpPr>
+          <p:nvPr/>
+        </p:nvCxnSpPr>
+        <p:spPr>
+          <a:xfrm>
+            <a:off x="3161920" y="1911306"/>
+            <a:ext cx="937470" cy="0"/>
+          </a:xfrm>
+          <a:prstGeom prst="straightConnector1">
+            <a:avLst/>
+          </a:prstGeom>
+          <a:ln>
+            <a:tailEnd type="triangle"/>
+          </a:ln>
+        </p:spPr>
+        <p:style>
+          <a:lnRef idx="1">
+            <a:schemeClr val="dk1"/>
+          </a:lnRef>
+          <a:fillRef idx="0">
+            <a:schemeClr val="dk1"/>
+          </a:fillRef>
+          <a:effectRef idx="0">
+            <a:schemeClr val="dk1"/>
+          </a:effectRef>
+          <a:fontRef idx="minor">
+            <a:schemeClr val="tx1"/>
+          </a:fontRef>
+        </p:style>
+      </p:cxnSp>
+      <mc:AlternateContent xmlns:mc="http://schemas.openxmlformats.org/markup-compatibility/2006" xmlns:a14="http://schemas.microsoft.com/office/drawing/2010/main">
+        <mc:Choice Requires="a14">
+          <p:sp>
+            <p:nvSpPr>
+              <p:cNvPr id="30" name="TextBox 29">
+                <a:extLst>
+                  <a:ext uri="{FF2B5EF4-FFF2-40B4-BE49-F238E27FC236}">
+                    <a16:creationId xmlns:a16="http://schemas.microsoft.com/office/drawing/2014/main" id="{951E643F-1D98-4DF9-9A70-142B8D153C0C}"/>
+                  </a:ext>
+                </a:extLst>
+              </p:cNvPr>
+              <p:cNvSpPr txBox="1"/>
+              <p:nvPr/>
+            </p:nvSpPr>
+            <p:spPr>
+              <a:xfrm>
+                <a:off x="2523674" y="1644966"/>
+                <a:ext cx="638246" cy="519351"/>
+              </a:xfrm>
+              <a:prstGeom prst="ellipse">
+                <a:avLst/>
+              </a:prstGeom>
+              <a:noFill/>
+              <a:ln w="15875">
+                <a:solidFill>
+                  <a:schemeClr val="tx1"/>
+                </a:solidFill>
+              </a:ln>
+            </p:spPr>
+            <p:txBody>
+              <a:bodyPr wrap="square" rtlCol="0">
+                <a:spAutoFit/>
+              </a:bodyPr>
+              <a:lstStyle/>
+              <a:p>
+                <a:pPr/>
+                <a14:m>
+                  <m:oMathPara xmlns:m="http://schemas.openxmlformats.org/officeDocument/2006/math">
+                    <m:oMathParaPr>
+                      <m:jc m:val="centerGroup"/>
+                    </m:oMathParaPr>
+                    <m:oMath xmlns:m="http://schemas.openxmlformats.org/officeDocument/2006/math">
+                      <m:r>
+                        <a:rPr lang="en-US" i="1" smtClean="0">
+                          <a:latin typeface="Cambria Math" panose="02040503050406030204" pitchFamily="18" charset="0"/>
+                        </a:rPr>
+                        <m:t>𝑃</m:t>
+                      </m:r>
+                    </m:oMath>
+                  </m:oMathPara>
+                </a14:m>
+                <a:endParaRPr lang="en-US" dirty="0"/>
+              </a:p>
+            </p:txBody>
+          </p:sp>
+        </mc:Choice>
+        <mc:Fallback xmlns="">
+          <p:sp>
+            <p:nvSpPr>
+              <p:cNvPr id="30" name="TextBox 29">
+                <a:extLst>
+                  <a:ext uri="{FF2B5EF4-FFF2-40B4-BE49-F238E27FC236}">
+                    <a16:creationId xmlns:a16="http://schemas.microsoft.com/office/drawing/2014/main" id="{951E643F-1D98-4DF9-9A70-142B8D153C0C}"/>
+                  </a:ext>
+                </a:extLst>
+              </p:cNvPr>
+              <p:cNvSpPr txBox="1">
+                <a:spLocks noRot="1" noChangeAspect="1" noMove="1" noResize="1" noEditPoints="1" noAdjustHandles="1" noChangeArrowheads="1" noChangeShapeType="1" noTextEdit="1"/>
+              </p:cNvSpPr>
+              <p:nvPr/>
+            </p:nvSpPr>
+            <p:spPr>
+              <a:xfrm>
+                <a:off x="2523674" y="1644966"/>
+                <a:ext cx="638246" cy="519351"/>
+              </a:xfrm>
+              <a:prstGeom prst="ellipse">
+                <a:avLst/>
+              </a:prstGeom>
+              <a:blipFill>
+                <a:blip r:embed="rId4"/>
+                <a:stretch>
+                  <a:fillRect/>
+                </a:stretch>
+              </a:blipFill>
+              <a:ln w="15875">
+                <a:solidFill>
+                  <a:schemeClr val="tx1"/>
+                </a:solidFill>
+              </a:ln>
+            </p:spPr>
+            <p:txBody>
+              <a:bodyPr/>
+              <a:lstStyle/>
+              <a:p>
+                <a:r>
+                  <a:rPr lang="en-US">
+                    <a:noFill/>
+                  </a:rPr>
+                  <a:t> </a:t>
+                </a:r>
+              </a:p>
+            </p:txBody>
+          </p:sp>
+        </mc:Fallback>
+      </mc:AlternateContent>
+      <p:cxnSp>
+        <p:nvCxnSpPr>
+          <p:cNvPr id="32" name="Straight Arrow Connector 31">
+            <a:extLst>
+              <a:ext uri="{FF2B5EF4-FFF2-40B4-BE49-F238E27FC236}">
+                <a16:creationId xmlns:a16="http://schemas.microsoft.com/office/drawing/2014/main" id="{E2C00AF0-901D-4408-B7F3-FA9B272FAE44}"/>
+              </a:ext>
+            </a:extLst>
+          </p:cNvPr>
+          <p:cNvCxnSpPr>
+            <a:cxnSpLocks/>
+          </p:cNvCxnSpPr>
+          <p:nvPr/>
+        </p:nvCxnSpPr>
+        <p:spPr>
+          <a:xfrm>
+            <a:off x="5036860" y="1891175"/>
+            <a:ext cx="937470" cy="0"/>
+          </a:xfrm>
+          <a:prstGeom prst="straightConnector1">
+            <a:avLst/>
+          </a:prstGeom>
+          <a:ln>
+            <a:tailEnd type="triangle"/>
+          </a:ln>
+        </p:spPr>
+        <p:style>
+          <a:lnRef idx="1">
+            <a:schemeClr val="dk1"/>
+          </a:lnRef>
+          <a:fillRef idx="0">
+            <a:schemeClr val="dk1"/>
+          </a:fillRef>
+          <a:effectRef idx="0">
+            <a:schemeClr val="dk1"/>
+          </a:effectRef>
+          <a:fontRef idx="minor">
+            <a:schemeClr val="tx1"/>
+          </a:fontRef>
+        </p:style>
+      </p:cxnSp>
+      <mc:AlternateContent xmlns:mc="http://schemas.openxmlformats.org/markup-compatibility/2006" xmlns:a14="http://schemas.microsoft.com/office/drawing/2010/main">
+        <mc:Choice Requires="a14">
+          <p:sp>
+            <p:nvSpPr>
+              <p:cNvPr id="34" name="TextBox 33">
+                <a:extLst>
+                  <a:ext uri="{FF2B5EF4-FFF2-40B4-BE49-F238E27FC236}">
+                    <a16:creationId xmlns:a16="http://schemas.microsoft.com/office/drawing/2014/main" id="{81DF5EC4-0DC4-4D25-BEB0-34BECD1D5178}"/>
+                  </a:ext>
+                </a:extLst>
+              </p:cNvPr>
+              <p:cNvSpPr txBox="1"/>
+              <p:nvPr/>
+            </p:nvSpPr>
+            <p:spPr>
+              <a:xfrm>
+                <a:off x="4099390" y="1644966"/>
+                <a:ext cx="937470" cy="519351"/>
+              </a:xfrm>
+              <a:prstGeom prst="ellipse">
+                <a:avLst/>
+              </a:prstGeom>
+              <a:noFill/>
+              <a:ln w="15875">
+                <a:solidFill>
+                  <a:schemeClr val="tx1"/>
+                </a:solidFill>
+              </a:ln>
+            </p:spPr>
+            <p:txBody>
+              <a:bodyPr wrap="square" rtlCol="0">
+                <a:spAutoFit/>
+              </a:bodyPr>
+              <a:lstStyle/>
+              <a:p>
+                <a:pPr/>
+                <a14:m>
+                  <m:oMathPara xmlns:m="http://schemas.openxmlformats.org/officeDocument/2006/math">
+                    <m:oMathParaPr>
+                      <m:jc m:val="centerGroup"/>
+                    </m:oMathParaPr>
+                    <m:oMath xmlns:m="http://schemas.openxmlformats.org/officeDocument/2006/math">
+                      <m:r>
+                        <a:rPr lang="en-US" b="0" i="1" smtClean="0">
+                          <a:latin typeface="Cambria Math" panose="02040503050406030204" pitchFamily="18" charset="0"/>
+                        </a:rPr>
+                        <m:t>𝐵</m:t>
+                      </m:r>
+                      <m:r>
+                        <a:rPr lang="en-US" b="0" i="1" smtClean="0">
+                          <a:latin typeface="Cambria Math" panose="02040503050406030204" pitchFamily="18" charset="0"/>
+                        </a:rPr>
+                        <m:t>_</m:t>
+                      </m:r>
+                      <m:r>
+                        <a:rPr lang="en-US" b="0" i="1" smtClean="0">
+                          <a:latin typeface="Cambria Math" panose="02040503050406030204" pitchFamily="18" charset="0"/>
+                        </a:rPr>
+                        <m:t>𝐶𝐼</m:t>
+                      </m:r>
+                    </m:oMath>
+                  </m:oMathPara>
+                </a14:m>
+                <a:endParaRPr lang="en-US" dirty="0"/>
+              </a:p>
+            </p:txBody>
+          </p:sp>
+        </mc:Choice>
+        <mc:Fallback xmlns="">
+          <p:sp>
+            <p:nvSpPr>
+              <p:cNvPr id="34" name="TextBox 33">
+                <a:extLst>
+                  <a:ext uri="{FF2B5EF4-FFF2-40B4-BE49-F238E27FC236}">
+                    <a16:creationId xmlns:a16="http://schemas.microsoft.com/office/drawing/2014/main" id="{81DF5EC4-0DC4-4D25-BEB0-34BECD1D5178}"/>
+                  </a:ext>
+                </a:extLst>
+              </p:cNvPr>
+              <p:cNvSpPr txBox="1">
+                <a:spLocks noRot="1" noChangeAspect="1" noMove="1" noResize="1" noEditPoints="1" noAdjustHandles="1" noChangeArrowheads="1" noChangeShapeType="1" noTextEdit="1"/>
+              </p:cNvSpPr>
+              <p:nvPr/>
+            </p:nvSpPr>
+            <p:spPr>
+              <a:xfrm>
+                <a:off x="4099390" y="1644966"/>
+                <a:ext cx="937470" cy="519351"/>
+              </a:xfrm>
+              <a:prstGeom prst="ellipse">
+                <a:avLst/>
+              </a:prstGeom>
+              <a:blipFill>
+                <a:blip r:embed="rId5"/>
+                <a:stretch>
+                  <a:fillRect/>
+                </a:stretch>
+              </a:blipFill>
+              <a:ln w="15875">
+                <a:solidFill>
+                  <a:schemeClr val="tx1"/>
+                </a:solidFill>
+              </a:ln>
+            </p:spPr>
+            <p:txBody>
+              <a:bodyPr/>
+              <a:lstStyle/>
+              <a:p>
+                <a:r>
+                  <a:rPr lang="en-US">
+                    <a:noFill/>
+                  </a:rPr>
+                  <a:t> </a:t>
+                </a:r>
+              </a:p>
+            </p:txBody>
+          </p:sp>
+        </mc:Fallback>
+      </mc:AlternateContent>
+      <p:sp>
+        <p:nvSpPr>
+          <p:cNvPr id="51" name="Freeform: Shape 50">
+            <a:extLst>
+              <a:ext uri="{FF2B5EF4-FFF2-40B4-BE49-F238E27FC236}">
+                <a16:creationId xmlns:a16="http://schemas.microsoft.com/office/drawing/2014/main" id="{243DB43F-3FBE-4F67-8E7A-541049F70A71}"/>
+              </a:ext>
+            </a:extLst>
+          </p:cNvPr>
+          <p:cNvSpPr/>
+          <p:nvPr/>
+        </p:nvSpPr>
+        <p:spPr>
+          <a:xfrm>
+            <a:off x="2409746" y="1207377"/>
+            <a:ext cx="433051" cy="437589"/>
+          </a:xfrm>
+          <a:custGeom>
+            <a:avLst/>
+            <a:gdLst>
+              <a:gd name="connsiteX0" fmla="*/ 422193 w 433051"/>
+              <a:gd name="connsiteY0" fmla="*/ 418928 h 437589"/>
+              <a:gd name="connsiteX1" fmla="*/ 394201 w 433051"/>
+              <a:gd name="connsiteY1" fmla="*/ 73695 h 437589"/>
+              <a:gd name="connsiteX2" fmla="*/ 104952 w 433051"/>
+              <a:gd name="connsiteY2" fmla="*/ 17711 h 437589"/>
+              <a:gd name="connsiteX3" fmla="*/ 2316 w 433051"/>
+              <a:gd name="connsiteY3" fmla="*/ 306960 h 437589"/>
+              <a:gd name="connsiteX4" fmla="*/ 188928 w 433051"/>
+              <a:gd name="connsiteY4" fmla="*/ 437589 h 437589"/>
+            </a:gdLst>
+            <a:ahLst/>
+            <a:cxnLst>
+              <a:cxn ang="0">
+                <a:pos x="connsiteX0" y="connsiteY0"/>
+              </a:cxn>
+              <a:cxn ang="0">
+                <a:pos x="connsiteX1" y="connsiteY1"/>
+              </a:cxn>
+              <a:cxn ang="0">
+                <a:pos x="connsiteX2" y="connsiteY2"/>
+              </a:cxn>
+              <a:cxn ang="0">
+                <a:pos x="connsiteX3" y="connsiteY3"/>
+              </a:cxn>
+              <a:cxn ang="0">
+                <a:pos x="connsiteX4" y="connsiteY4"/>
+              </a:cxn>
+            </a:cxnLst>
+            <a:rect l="l" t="t" r="r" b="b"/>
+            <a:pathLst>
+              <a:path w="433051" h="437589">
+                <a:moveTo>
+                  <a:pt x="422193" y="418928"/>
+                </a:moveTo>
+                <a:cubicBezTo>
+                  <a:pt x="434633" y="279746"/>
+                  <a:pt x="447074" y="140564"/>
+                  <a:pt x="394201" y="73695"/>
+                </a:cubicBezTo>
+                <a:cubicBezTo>
+                  <a:pt x="341328" y="6826"/>
+                  <a:pt x="170266" y="-21167"/>
+                  <a:pt x="104952" y="17711"/>
+                </a:cubicBezTo>
+                <a:cubicBezTo>
+                  <a:pt x="39638" y="56588"/>
+                  <a:pt x="-11680" y="236980"/>
+                  <a:pt x="2316" y="306960"/>
+                </a:cubicBezTo>
+                <a:cubicBezTo>
+                  <a:pt x="16312" y="376940"/>
+                  <a:pt x="-31897" y="373830"/>
+                  <a:pt x="188928" y="437589"/>
+                </a:cubicBezTo>
+              </a:path>
+            </a:pathLst>
+          </a:custGeom>
+          <a:noFill/>
+          <a:ln>
+            <a:solidFill>
+              <a:schemeClr val="tx1"/>
+            </a:solidFill>
+            <a:tailEnd type="triangle"/>
+          </a:ln>
+        </p:spPr>
+        <p:style>
+          <a:lnRef idx="2">
+            <a:schemeClr val="accent1">
+              <a:shade val="50000"/>
+            </a:schemeClr>
+          </a:lnRef>
+          <a:fillRef idx="1">
+            <a:schemeClr val="accent1"/>
+          </a:fillRef>
+          <a:effectRef idx="0">
+            <a:schemeClr val="accent1"/>
+          </a:effectRef>
+          <a:fontRef idx="minor">
+            <a:schemeClr val="lt1"/>
+          </a:fontRef>
+        </p:style>
+        <p:txBody>
+          <a:bodyPr rtlCol="0" anchor="ctr"/>
+          <a:lstStyle/>
+          <a:p>
+            <a:pPr algn="ctr"/>
+            <a:endParaRPr lang="en-US"/>
+          </a:p>
+        </p:txBody>
+      </p:sp>
+      <p:sp>
+        <p:nvSpPr>
+          <p:cNvPr id="52" name="Freeform: Shape 51">
+            <a:extLst>
+              <a:ext uri="{FF2B5EF4-FFF2-40B4-BE49-F238E27FC236}">
+                <a16:creationId xmlns:a16="http://schemas.microsoft.com/office/drawing/2014/main" id="{1F5831A0-A96F-4566-A7A0-A5D6F4EDA127}"/>
+              </a:ext>
+            </a:extLst>
+          </p:cNvPr>
+          <p:cNvSpPr/>
+          <p:nvPr/>
+        </p:nvSpPr>
+        <p:spPr>
+          <a:xfrm>
+            <a:off x="4135074" y="1159311"/>
+            <a:ext cx="433051" cy="437589"/>
+          </a:xfrm>
+          <a:custGeom>
+            <a:avLst/>
+            <a:gdLst>
+              <a:gd name="connsiteX0" fmla="*/ 422193 w 433051"/>
+              <a:gd name="connsiteY0" fmla="*/ 418928 h 437589"/>
+              <a:gd name="connsiteX1" fmla="*/ 394201 w 433051"/>
+              <a:gd name="connsiteY1" fmla="*/ 73695 h 437589"/>
+              <a:gd name="connsiteX2" fmla="*/ 104952 w 433051"/>
+              <a:gd name="connsiteY2" fmla="*/ 17711 h 437589"/>
+              <a:gd name="connsiteX3" fmla="*/ 2316 w 433051"/>
+              <a:gd name="connsiteY3" fmla="*/ 306960 h 437589"/>
+              <a:gd name="connsiteX4" fmla="*/ 188928 w 433051"/>
+              <a:gd name="connsiteY4" fmla="*/ 437589 h 437589"/>
+            </a:gdLst>
+            <a:ahLst/>
+            <a:cxnLst>
+              <a:cxn ang="0">
+                <a:pos x="connsiteX0" y="connsiteY0"/>
+              </a:cxn>
+              <a:cxn ang="0">
+                <a:pos x="connsiteX1" y="connsiteY1"/>
+              </a:cxn>
+              <a:cxn ang="0">
+                <a:pos x="connsiteX2" y="connsiteY2"/>
+              </a:cxn>
+              <a:cxn ang="0">
+                <a:pos x="connsiteX3" y="connsiteY3"/>
+              </a:cxn>
+              <a:cxn ang="0">
+                <a:pos x="connsiteX4" y="connsiteY4"/>
+              </a:cxn>
+            </a:cxnLst>
+            <a:rect l="l" t="t" r="r" b="b"/>
+            <a:pathLst>
+              <a:path w="433051" h="437589">
+                <a:moveTo>
+                  <a:pt x="422193" y="418928"/>
+                </a:moveTo>
+                <a:cubicBezTo>
+                  <a:pt x="434633" y="279746"/>
+                  <a:pt x="447074" y="140564"/>
+                  <a:pt x="394201" y="73695"/>
+                </a:cubicBezTo>
+                <a:cubicBezTo>
+                  <a:pt x="341328" y="6826"/>
+                  <a:pt x="170266" y="-21167"/>
+                  <a:pt x="104952" y="17711"/>
+                </a:cubicBezTo>
+                <a:cubicBezTo>
+                  <a:pt x="39638" y="56588"/>
+                  <a:pt x="-11680" y="236980"/>
+                  <a:pt x="2316" y="306960"/>
+                </a:cubicBezTo>
+                <a:cubicBezTo>
+                  <a:pt x="16312" y="376940"/>
+                  <a:pt x="-31897" y="373830"/>
+                  <a:pt x="188928" y="437589"/>
+                </a:cubicBezTo>
+              </a:path>
+            </a:pathLst>
+          </a:custGeom>
+          <a:noFill/>
+          <a:ln>
+            <a:solidFill>
+              <a:schemeClr val="tx1"/>
+            </a:solidFill>
+            <a:tailEnd type="triangle"/>
+          </a:ln>
+        </p:spPr>
+        <p:style>
+          <a:lnRef idx="2">
+            <a:schemeClr val="accent1">
+              <a:shade val="50000"/>
+            </a:schemeClr>
+          </a:lnRef>
+          <a:fillRef idx="1">
+            <a:schemeClr val="accent1"/>
+          </a:fillRef>
+          <a:effectRef idx="0">
+            <a:schemeClr val="accent1"/>
+          </a:effectRef>
+          <a:fontRef idx="minor">
+            <a:schemeClr val="lt1"/>
+          </a:fontRef>
+        </p:style>
+        <p:txBody>
+          <a:bodyPr rtlCol="0" anchor="ctr"/>
+          <a:lstStyle/>
+          <a:p>
+            <a:pPr algn="ctr"/>
+            <a:endParaRPr lang="en-US"/>
+          </a:p>
+        </p:txBody>
+      </p:sp>
+    </p:spTree>
+    <p:extLst>
+      <p:ext uri="{BB962C8B-B14F-4D97-AF65-F5344CB8AC3E}">
+        <p14:creationId xmlns:p14="http://schemas.microsoft.com/office/powerpoint/2010/main" val="2765500730"/>
       </p:ext>
     </p:extLst>
   </p:cSld>

</xml_diff>